<commit_message>
Few style/wording tweaks and re-export PPT
</commit_message>
<xml_diff>
--- a/PPT_SparkR_Demo.pptx
+++ b/PPT_SparkR_Demo.pptx
@@ -35,6 +35,7 @@
     <p:sldId id="280" r:id="rId32"/>
     <p:sldId id="281" r:id="rId33"/>
     <p:sldId id="282" r:id="rId34"/>
+    <p:sldId id="283" r:id="rId35"/>
   </p:sldIdLst>
   <p:sldSz cx="13004800" cy="9753600"/>
   <p:notesSz cx="6858000" cy="9144000"/>
@@ -2604,7 +2605,7 @@
         <p:spPr>
           <a:xfrm>
             <a:off x="636786" y="2082800"/>
-            <a:ext cx="11731229" cy="6705600"/>
+            <a:ext cx="11731229" cy="6197600"/>
           </a:xfrm>
           <a:prstGeom prst="rect">
             <a:avLst/>
@@ -2972,36 +2973,6 @@
                 <a:sym typeface="Andale Mono"/>
               </a:rPr>
               <a:t>sum &lt;- reduce(ageInt,function(x,y) {x+y})</a:t>
-            </a:r>
-            <a:endParaRPr sz="3500">
-              <a:solidFill>
-                <a:srgbClr val="FFFFFF"/>
-              </a:solidFill>
-              <a:latin typeface="Andale Mono"/>
-              <a:ea typeface="Andale Mono"/>
-              <a:cs typeface="Andale Mono"/>
-              <a:sym typeface="Andale Mono"/>
-            </a:endParaRPr>
-          </a:p>
-          <a:p>
-            <a:pPr lvl="0" algn="l">
-              <a:defRPr sz="1800">
-                <a:solidFill>
-                  <a:srgbClr val="000000"/>
-                </a:solidFill>
-              </a:defRPr>
-            </a:pPr>
-            <a:r>
-              <a:rPr sz="3500">
-                <a:solidFill>
-                  <a:srgbClr val="FFFFFF"/>
-                </a:solidFill>
-                <a:latin typeface="Andale Mono"/>
-                <a:ea typeface="Andale Mono"/>
-                <a:cs typeface="Andale Mono"/>
-                <a:sym typeface="Andale Mono"/>
-              </a:rPr>
-              <a:t>avg &lt;- sum / count(peopleRDD)</a:t>
             </a:r>
           </a:p>
         </p:txBody>
@@ -3482,33 +3453,6 @@
           </a:p>
         </p:txBody>
       </p:sp>
-      <p:pic>
-        <p:nvPicPr>
-          <p:cNvPr id="70" name="pasted-image.png"/>
-          <p:cNvPicPr/>
-          <p:nvPr/>
-        </p:nvPicPr>
-        <p:blipFill>
-          <a:blip r:embed="rId2">
-            <a:extLst/>
-          </a:blip>
-          <a:stretch>
-            <a:fillRect/>
-          </a:stretch>
-        </p:blipFill>
-        <p:spPr>
-          <a:xfrm>
-            <a:off x="2286000" y="1778000"/>
-            <a:ext cx="8432800" cy="5610394"/>
-          </a:xfrm>
-          <a:prstGeom prst="rect">
-            <a:avLst/>
-          </a:prstGeom>
-          <a:ln w="12700">
-            <a:miter lim="400000"/>
-          </a:ln>
-        </p:spPr>
-      </p:pic>
     </p:spTree>
   </p:cSld>
   <p:clrMapOvr>
@@ -3537,7 +3481,7 @@
       </p:grpSpPr>
       <p:sp>
         <p:nvSpPr>
-          <p:cNvPr id="72" name="Shape 72"/>
+          <p:cNvPr id="71" name="Shape 71"/>
           <p:cNvSpPr/>
           <p:nvPr>
             <p:ph type="title"/>
@@ -3550,7 +3494,11 @@
         </p:spPr>
         <p:txBody>
           <a:bodyPr/>
-          <a:lstStyle/>
+          <a:lstStyle>
+            <a:lvl1pPr defTabSz="525779">
+              <a:defRPr sz="7200"/>
+            </a:lvl1pPr>
+          </a:lstStyle>
           <a:p>
             <a:pPr lvl="0">
               <a:defRPr sz="1800">
@@ -3560,117 +3508,454 @@
               </a:defRPr>
             </a:pPr>
             <a:r>
-              <a:rPr sz="8000">
-                <a:solidFill>
-                  <a:srgbClr val="FFFFFF"/>
-                </a:solidFill>
-              </a:rPr>
-              <a:t>SparkSQL</a:t>
+              <a:rPr sz="7200">
+                <a:solidFill>
+                  <a:srgbClr val="FFFFFF"/>
+                </a:solidFill>
+              </a:rPr>
+              <a:t>Example: Column Average</a:t>
             </a:r>
           </a:p>
         </p:txBody>
       </p:sp>
       <p:sp>
         <p:nvSpPr>
-          <p:cNvPr id="73" name="Shape 73"/>
+          <p:cNvPr id="72" name="Shape 72"/>
           <p:cNvSpPr/>
-          <p:nvPr>
-            <p:ph type="body" idx="1"/>
-          </p:nvPr>
+          <p:nvPr/>
         </p:nvSpPr>
         <p:spPr>
+          <a:xfrm>
+            <a:off x="636786" y="2082800"/>
+            <a:ext cx="11731229" cy="6705600"/>
+          </a:xfrm>
           <a:prstGeom prst="rect">
             <a:avLst/>
           </a:prstGeom>
+          <a:ln w="12700">
+            <a:miter lim="400000"/>
+          </a:ln>
+          <a:extLst>
+            <a:ext uri="{C572A759-6A51-4108-AA02-DFA0A04FC94B}">
+              <ma14:wrappingTextBoxFlag xmlns:ma14="http://schemas.microsoft.com/office/mac/drawingml/2011/main" val="1"/>
+            </a:ext>
+          </a:extLst>
         </p:spPr>
         <p:txBody>
-          <a:bodyPr anchor="t"/>
+          <a:bodyPr lIns="0" tIns="0" rIns="0" bIns="0">
+            <a:spAutoFit/>
+          </a:bodyPr>
           <a:lstStyle/>
           <a:p>
-            <a:pPr lvl="0">
-              <a:defRPr sz="1800">
-                <a:solidFill>
-                  <a:srgbClr val="000000"/>
-                </a:solidFill>
-              </a:defRPr>
-            </a:pPr>
-            <a:r>
-              <a:rPr sz="3800">
-                <a:solidFill>
-                  <a:srgbClr val="FFFFFF"/>
-                </a:solidFill>
-              </a:rPr>
-              <a:t>A SQL-like abstraction layer for Spark</a:t>
-            </a:r>
-            <a:endParaRPr sz="3800">
-              <a:solidFill>
-                <a:srgbClr val="FFFFFF"/>
-              </a:solidFill>
-            </a:endParaRPr>
-          </a:p>
-          <a:p>
-            <a:pPr lvl="0">
-              <a:defRPr sz="1800">
-                <a:solidFill>
-                  <a:srgbClr val="000000"/>
-                </a:solidFill>
-              </a:defRPr>
-            </a:pPr>
-            <a:r>
-              <a:rPr sz="3800">
-                <a:solidFill>
-                  <a:srgbClr val="FFFFFF"/>
-                </a:solidFill>
-              </a:rPr>
-              <a:t>Imposes a schema on RDDs</a:t>
-            </a:r>
-            <a:endParaRPr sz="3800">
-              <a:solidFill>
-                <a:srgbClr val="FFFFFF"/>
-              </a:solidFill>
-            </a:endParaRPr>
-          </a:p>
-          <a:p>
-            <a:pPr lvl="0">
-              <a:defRPr sz="1800">
-                <a:solidFill>
-                  <a:srgbClr val="000000"/>
-                </a:solidFill>
-              </a:defRPr>
-            </a:pPr>
-            <a:r>
-              <a:rPr sz="3800">
-                <a:solidFill>
-                  <a:srgbClr val="FFFFFF"/>
-                </a:solidFill>
-              </a:rPr>
-              <a:t>SQL expressions, aggregation functions, simpler data manipulation</a:t>
-            </a:r>
-            <a:endParaRPr sz="3800">
-              <a:solidFill>
-                <a:srgbClr val="FFFFFF"/>
-              </a:solidFill>
-            </a:endParaRPr>
-          </a:p>
-          <a:p>
-            <a:pPr lvl="0">
-              <a:defRPr sz="1800">
-                <a:solidFill>
-                  <a:srgbClr val="000000"/>
-                </a:solidFill>
-              </a:defRPr>
-            </a:pPr>
-            <a:r>
-              <a:rPr sz="3800">
-                <a:solidFill>
-                  <a:srgbClr val="FFFFFF"/>
-                </a:solidFill>
-              </a:rPr>
-              <a:t>SchemaRDDs</a:t>
+            <a:pPr lvl="0" algn="l">
+              <a:defRPr sz="1800">
+                <a:solidFill>
+                  <a:srgbClr val="000000"/>
+                </a:solidFill>
+              </a:defRPr>
+            </a:pPr>
+            <a:r>
+              <a:rPr sz="3500">
+                <a:solidFill>
+                  <a:srgbClr val="FFFFFF"/>
+                </a:solidFill>
+                <a:latin typeface="Andale Mono"/>
+                <a:ea typeface="Andale Mono"/>
+                <a:cs typeface="Andale Mono"/>
+                <a:sym typeface="Andale Mono"/>
+              </a:rPr>
+              <a:t>library(SparkR)</a:t>
+            </a:r>
+            <a:endParaRPr sz="3500">
+              <a:solidFill>
+                <a:srgbClr val="FFFFFF"/>
+              </a:solidFill>
+              <a:latin typeface="Andale Mono"/>
+              <a:ea typeface="Andale Mono"/>
+              <a:cs typeface="Andale Mono"/>
+              <a:sym typeface="Andale Mono"/>
+            </a:endParaRPr>
+          </a:p>
+          <a:p>
+            <a:pPr lvl="0" algn="l">
+              <a:defRPr sz="1800">
+                <a:solidFill>
+                  <a:srgbClr val="000000"/>
+                </a:solidFill>
+              </a:defRPr>
+            </a:pPr>
+            <a:r>
+              <a:rPr sz="3500">
+                <a:solidFill>
+                  <a:srgbClr val="FFFFFF"/>
+                </a:solidFill>
+                <a:latin typeface="Andale Mono"/>
+                <a:ea typeface="Andale Mono"/>
+                <a:cs typeface="Andale Mono"/>
+                <a:sym typeface="Andale Mono"/>
+              </a:rPr>
+              <a:t>sc &lt;- sparkR.init()</a:t>
+            </a:r>
+            <a:endParaRPr sz="3500">
+              <a:solidFill>
+                <a:srgbClr val="FFFFFF"/>
+              </a:solidFill>
+              <a:latin typeface="Andale Mono"/>
+              <a:ea typeface="Andale Mono"/>
+              <a:cs typeface="Andale Mono"/>
+              <a:sym typeface="Andale Mono"/>
+            </a:endParaRPr>
+          </a:p>
+          <a:p>
+            <a:pPr lvl="0" algn="l">
+              <a:defRPr sz="1800">
+                <a:solidFill>
+                  <a:srgbClr val="000000"/>
+                </a:solidFill>
+              </a:defRPr>
+            </a:pPr>
+            <a:r>
+              <a:rPr sz="3500">
+                <a:solidFill>
+                  <a:srgbClr val="FFFFFF"/>
+                </a:solidFill>
+                <a:latin typeface="Andale Mono"/>
+                <a:ea typeface="Andale Mono"/>
+                <a:cs typeface="Andale Mono"/>
+                <a:sym typeface="Andale Mono"/>
+              </a:rPr>
+              <a:t>peopleRDD &lt;- textFile(sc, “people.txt”)</a:t>
+            </a:r>
+            <a:endParaRPr sz="3500">
+              <a:solidFill>
+                <a:srgbClr val="FFFFFF"/>
+              </a:solidFill>
+              <a:latin typeface="Andale Mono"/>
+              <a:ea typeface="Andale Mono"/>
+              <a:cs typeface="Andale Mono"/>
+              <a:sym typeface="Andale Mono"/>
+            </a:endParaRPr>
+          </a:p>
+          <a:p>
+            <a:pPr lvl="0" algn="l">
+              <a:defRPr sz="1800">
+                <a:solidFill>
+                  <a:srgbClr val="000000"/>
+                </a:solidFill>
+              </a:defRPr>
+            </a:pPr>
+            <a:r>
+              <a:rPr sz="3500">
+                <a:solidFill>
+                  <a:srgbClr val="FFFFFF"/>
+                </a:solidFill>
+                <a:latin typeface="Andale Mono"/>
+                <a:ea typeface="Andale Mono"/>
+                <a:cs typeface="Andale Mono"/>
+                <a:sym typeface="Andale Mono"/>
+              </a:rPr>
+              <a:t>lines &lt;- flatMap(peopleRDD,</a:t>
+            </a:r>
+            <a:endParaRPr sz="3500">
+              <a:solidFill>
+                <a:srgbClr val="FFFFFF"/>
+              </a:solidFill>
+              <a:latin typeface="Andale Mono"/>
+              <a:ea typeface="Andale Mono"/>
+              <a:cs typeface="Andale Mono"/>
+              <a:sym typeface="Andale Mono"/>
+            </a:endParaRPr>
+          </a:p>
+          <a:p>
+            <a:pPr lvl="0" algn="l">
+              <a:defRPr sz="1800">
+                <a:solidFill>
+                  <a:srgbClr val="000000"/>
+                </a:solidFill>
+              </a:defRPr>
+            </a:pPr>
+            <a:r>
+              <a:rPr sz="3500">
+                <a:solidFill>
+                  <a:srgbClr val="FFFFFF"/>
+                </a:solidFill>
+                <a:latin typeface="Andale Mono"/>
+                <a:ea typeface="Andale Mono"/>
+                <a:cs typeface="Andale Mono"/>
+                <a:sym typeface="Andale Mono"/>
+              </a:rPr>
+              <a:t>                 function(line) {</a:t>
+            </a:r>
+            <a:endParaRPr sz="3500">
+              <a:solidFill>
+                <a:srgbClr val="FFFFFF"/>
+              </a:solidFill>
+              <a:latin typeface="Andale Mono"/>
+              <a:ea typeface="Andale Mono"/>
+              <a:cs typeface="Andale Mono"/>
+              <a:sym typeface="Andale Mono"/>
+            </a:endParaRPr>
+          </a:p>
+          <a:p>
+            <a:pPr lvl="0" algn="l">
+              <a:defRPr sz="1800">
+                <a:solidFill>
+                  <a:srgbClr val="000000"/>
+                </a:solidFill>
+              </a:defRPr>
+            </a:pPr>
+            <a:r>
+              <a:rPr sz="3500">
+                <a:solidFill>
+                  <a:srgbClr val="FFFFFF"/>
+                </a:solidFill>
+                <a:latin typeface="Andale Mono"/>
+                <a:ea typeface="Andale Mono"/>
+                <a:cs typeface="Andale Mono"/>
+                <a:sym typeface="Andale Mono"/>
+              </a:rPr>
+              <a:t>                   strsplit(line, ", ")</a:t>
+            </a:r>
+            <a:endParaRPr sz="3500">
+              <a:solidFill>
+                <a:srgbClr val="FFFFFF"/>
+              </a:solidFill>
+              <a:latin typeface="Andale Mono"/>
+              <a:ea typeface="Andale Mono"/>
+              <a:cs typeface="Andale Mono"/>
+              <a:sym typeface="Andale Mono"/>
+            </a:endParaRPr>
+          </a:p>
+          <a:p>
+            <a:pPr lvl="0" algn="l">
+              <a:defRPr sz="1800">
+                <a:solidFill>
+                  <a:srgbClr val="000000"/>
+                </a:solidFill>
+              </a:defRPr>
+            </a:pPr>
+            <a:r>
+              <a:rPr sz="3500">
+                <a:solidFill>
+                  <a:srgbClr val="FFFFFF"/>
+                </a:solidFill>
+                <a:latin typeface="Andale Mono"/>
+                <a:ea typeface="Andale Mono"/>
+                <a:cs typeface="Andale Mono"/>
+                <a:sym typeface="Andale Mono"/>
+              </a:rPr>
+              <a:t>                 })</a:t>
+            </a:r>
+            <a:endParaRPr sz="3500">
+              <a:solidFill>
+                <a:srgbClr val="FFFFFF"/>
+              </a:solidFill>
+              <a:latin typeface="Andale Mono"/>
+              <a:ea typeface="Andale Mono"/>
+              <a:cs typeface="Andale Mono"/>
+              <a:sym typeface="Andale Mono"/>
+            </a:endParaRPr>
+          </a:p>
+          <a:p>
+            <a:pPr lvl="0" algn="l">
+              <a:defRPr sz="1800">
+                <a:solidFill>
+                  <a:srgbClr val="000000"/>
+                </a:solidFill>
+              </a:defRPr>
+            </a:pPr>
+            <a:r>
+              <a:rPr sz="3500">
+                <a:solidFill>
+                  <a:srgbClr val="FFFFFF"/>
+                </a:solidFill>
+                <a:latin typeface="Andale Mono"/>
+                <a:ea typeface="Andale Mono"/>
+                <a:cs typeface="Andale Mono"/>
+                <a:sym typeface="Andale Mono"/>
+              </a:rPr>
+              <a:t>ageInt &lt;- lapply(lines,</a:t>
+            </a:r>
+            <a:endParaRPr sz="3500">
+              <a:solidFill>
+                <a:srgbClr val="FFFFFF"/>
+              </a:solidFill>
+              <a:latin typeface="Andale Mono"/>
+              <a:ea typeface="Andale Mono"/>
+              <a:cs typeface="Andale Mono"/>
+              <a:sym typeface="Andale Mono"/>
+            </a:endParaRPr>
+          </a:p>
+          <a:p>
+            <a:pPr lvl="0" algn="l">
+              <a:defRPr sz="1800">
+                <a:solidFill>
+                  <a:srgbClr val="000000"/>
+                </a:solidFill>
+              </a:defRPr>
+            </a:pPr>
+            <a:r>
+              <a:rPr sz="3500">
+                <a:solidFill>
+                  <a:srgbClr val="FFFFFF"/>
+                </a:solidFill>
+                <a:latin typeface="Andale Mono"/>
+                <a:ea typeface="Andale Mono"/>
+                <a:cs typeface="Andale Mono"/>
+                <a:sym typeface="Andale Mono"/>
+              </a:rPr>
+              <a:t>                 function(line) {</a:t>
+            </a:r>
+            <a:endParaRPr sz="3500">
+              <a:solidFill>
+                <a:srgbClr val="FFFFFF"/>
+              </a:solidFill>
+              <a:latin typeface="Andale Mono"/>
+              <a:ea typeface="Andale Mono"/>
+              <a:cs typeface="Andale Mono"/>
+              <a:sym typeface="Andale Mono"/>
+            </a:endParaRPr>
+          </a:p>
+          <a:p>
+            <a:pPr lvl="0" algn="l">
+              <a:defRPr sz="1800">
+                <a:solidFill>
+                  <a:srgbClr val="000000"/>
+                </a:solidFill>
+              </a:defRPr>
+            </a:pPr>
+            <a:r>
+              <a:rPr sz="3500">
+                <a:solidFill>
+                  <a:srgbClr val="FFFFFF"/>
+                </a:solidFill>
+                <a:latin typeface="Andale Mono"/>
+                <a:ea typeface="Andale Mono"/>
+                <a:cs typeface="Andale Mono"/>
+                <a:sym typeface="Andale Mono"/>
+              </a:rPr>
+              <a:t>                   as.numeric(line[2])</a:t>
+            </a:r>
+            <a:endParaRPr sz="3500">
+              <a:solidFill>
+                <a:srgbClr val="FFFFFF"/>
+              </a:solidFill>
+              <a:latin typeface="Andale Mono"/>
+              <a:ea typeface="Andale Mono"/>
+              <a:cs typeface="Andale Mono"/>
+              <a:sym typeface="Andale Mono"/>
+            </a:endParaRPr>
+          </a:p>
+          <a:p>
+            <a:pPr lvl="0" algn="l">
+              <a:defRPr sz="1800">
+                <a:solidFill>
+                  <a:srgbClr val="000000"/>
+                </a:solidFill>
+              </a:defRPr>
+            </a:pPr>
+            <a:r>
+              <a:rPr sz="3500">
+                <a:solidFill>
+                  <a:srgbClr val="FFFFFF"/>
+                </a:solidFill>
+                <a:latin typeface="Andale Mono"/>
+                <a:ea typeface="Andale Mono"/>
+                <a:cs typeface="Andale Mono"/>
+                <a:sym typeface="Andale Mono"/>
+              </a:rPr>
+              <a:t>                 })</a:t>
+            </a:r>
+            <a:endParaRPr sz="3500">
+              <a:solidFill>
+                <a:srgbClr val="FFFFFF"/>
+              </a:solidFill>
+              <a:latin typeface="Andale Mono"/>
+              <a:ea typeface="Andale Mono"/>
+              <a:cs typeface="Andale Mono"/>
+              <a:sym typeface="Andale Mono"/>
+            </a:endParaRPr>
+          </a:p>
+          <a:p>
+            <a:pPr lvl="0" algn="l">
+              <a:defRPr sz="1800">
+                <a:solidFill>
+                  <a:srgbClr val="000000"/>
+                </a:solidFill>
+              </a:defRPr>
+            </a:pPr>
+            <a:r>
+              <a:rPr sz="3500">
+                <a:solidFill>
+                  <a:srgbClr val="FFFFFF"/>
+                </a:solidFill>
+                <a:latin typeface="Andale Mono"/>
+                <a:ea typeface="Andale Mono"/>
+                <a:cs typeface="Andale Mono"/>
+                <a:sym typeface="Andale Mono"/>
+              </a:rPr>
+              <a:t>sum &lt;- reduce(ageInt,function(x,y) {x+y})</a:t>
+            </a:r>
+            <a:endParaRPr sz="3500">
+              <a:solidFill>
+                <a:srgbClr val="FFFFFF"/>
+              </a:solidFill>
+              <a:latin typeface="Andale Mono"/>
+              <a:ea typeface="Andale Mono"/>
+              <a:cs typeface="Andale Mono"/>
+              <a:sym typeface="Andale Mono"/>
+            </a:endParaRPr>
+          </a:p>
+          <a:p>
+            <a:pPr lvl="0" algn="l">
+              <a:defRPr sz="1800">
+                <a:solidFill>
+                  <a:srgbClr val="000000"/>
+                </a:solidFill>
+              </a:defRPr>
+            </a:pPr>
+            <a:r>
+              <a:rPr sz="3500">
+                <a:solidFill>
+                  <a:srgbClr val="FFFFFF"/>
+                </a:solidFill>
+                <a:latin typeface="Andale Mono"/>
+                <a:ea typeface="Andale Mono"/>
+                <a:cs typeface="Andale Mono"/>
+                <a:sym typeface="Andale Mono"/>
+              </a:rPr>
+              <a:t>avg &lt;- sum / count(peopleRDD)</a:t>
             </a:r>
           </a:p>
         </p:txBody>
       </p:sp>
+      <p:pic>
+        <p:nvPicPr>
+          <p:cNvPr id="73" name="pasted-image.png"/>
+          <p:cNvPicPr/>
+          <p:nvPr/>
+        </p:nvPicPr>
+        <p:blipFill>
+          <a:blip r:embed="rId2">
+            <a:extLst/>
+          </a:blip>
+          <a:stretch>
+            <a:fillRect/>
+          </a:stretch>
+        </p:blipFill>
+        <p:spPr>
+          <a:xfrm>
+            <a:off x="2286000" y="1778000"/>
+            <a:ext cx="8432800" cy="5610394"/>
+          </a:xfrm>
+          <a:prstGeom prst="rect">
+            <a:avLst/>
+          </a:prstGeom>
+          <a:ln w="12700">
+            <a:miter lim="400000"/>
+          </a:ln>
+        </p:spPr>
+      </p:pic>
     </p:spTree>
   </p:cSld>
   <p:clrMapOvr>
@@ -3823,20 +4108,12 @@
               </a:defRPr>
             </a:pPr>
             <a:r>
-              <a:rPr strike="sngStrike" sz="3800">
+              <a:rPr sz="3800">
                 <a:solidFill>
                   <a:srgbClr val="FFFFFF"/>
                 </a:solidFill>
               </a:rPr>
               <a:t>SchemaRDDs</a:t>
-            </a:r>
-            <a:r>
-              <a:rPr sz="3800">
-                <a:solidFill>
-                  <a:srgbClr val="FFFFFF"/>
-                </a:solidFill>
-              </a:rPr>
-              <a:t> DataFrames!</a:t>
             </a:r>
           </a:p>
         </p:txBody>
@@ -3897,7 +4174,7 @@
                   <a:srgbClr val="FFFFFF"/>
                 </a:solidFill>
               </a:rPr>
-              <a:t>DataFrames</a:t>
+              <a:t>SparkSQL</a:t>
             </a:r>
           </a:p>
         </p:txBody>
@@ -3932,7 +4209,7 @@
                   <a:srgbClr val="FFFFFF"/>
                 </a:solidFill>
               </a:rPr>
-              <a:t>New API for Spark 1.3. Takes the place of SchemaRDDs.</a:t>
+              <a:t>A SQL-like abstraction layer for Spark</a:t>
             </a:r>
             <a:endParaRPr sz="3800">
               <a:solidFill>
@@ -3954,7 +4231,7 @@
                   <a:srgbClr val="FFFFFF"/>
                 </a:solidFill>
               </a:rPr>
-              <a:t>Still provides all of the existing relational database-like features of the SchemaRDD</a:t>
+              <a:t>Imposes a schema on RDDs</a:t>
             </a:r>
             <a:endParaRPr sz="3800">
               <a:solidFill>
@@ -3976,7 +4253,37 @@
                   <a:srgbClr val="FFFFFF"/>
                 </a:solidFill>
               </a:rPr>
-              <a:t>Adds greater Column accessibility and built-in methods for manipulation and aggregation.</a:t>
+              <a:t>SQL expressions, aggregation functions, simpler data manipulation</a:t>
+            </a:r>
+            <a:endParaRPr sz="3800">
+              <a:solidFill>
+                <a:srgbClr val="FFFFFF"/>
+              </a:solidFill>
+            </a:endParaRPr>
+          </a:p>
+          <a:p>
+            <a:pPr lvl="0">
+              <a:defRPr sz="1800">
+                <a:solidFill>
+                  <a:srgbClr val="000000"/>
+                </a:solidFill>
+              </a:defRPr>
+            </a:pPr>
+            <a:r>
+              <a:rPr strike="sngStrike" sz="3800">
+                <a:solidFill>
+                  <a:srgbClr val="FFFFFF"/>
+                </a:solidFill>
+              </a:rPr>
+              <a:t>SchemaRDDs</a:t>
+            </a:r>
+            <a:r>
+              <a:rPr sz="3800">
+                <a:solidFill>
+                  <a:srgbClr val="FFFFFF"/>
+                </a:solidFill>
+              </a:rPr>
+              <a:t> DataFrames!</a:t>
             </a:r>
           </a:p>
         </p:txBody>
@@ -4022,11 +4329,7 @@
         </p:spPr>
         <p:txBody>
           <a:bodyPr/>
-          <a:lstStyle>
-            <a:lvl1pPr defTabSz="525779">
-              <a:defRPr sz="7200"/>
-            </a:lvl1pPr>
-          </a:lstStyle>
+          <a:lstStyle/>
           <a:p>
             <a:pPr lvl="0">
               <a:defRPr sz="1800">
@@ -4036,12 +4339,12 @@
               </a:defRPr>
             </a:pPr>
             <a:r>
-              <a:rPr sz="7200">
-                <a:solidFill>
-                  <a:srgbClr val="FFFFFF"/>
-                </a:solidFill>
-              </a:rPr>
-              <a:t>Example: Column Average</a:t>
+              <a:rPr sz="8000">
+                <a:solidFill>
+                  <a:srgbClr val="FFFFFF"/>
+                </a:solidFill>
+              </a:rPr>
+              <a:t>DataFrames</a:t>
             </a:r>
           </a:p>
         </p:txBody>
@@ -4050,125 +4353,78 @@
         <p:nvSpPr>
           <p:cNvPr id="82" name="Shape 82"/>
           <p:cNvSpPr/>
-          <p:nvPr/>
+          <p:nvPr>
+            <p:ph type="body" idx="1"/>
+          </p:nvPr>
         </p:nvSpPr>
         <p:spPr>
-          <a:xfrm>
-            <a:off x="636786" y="2082800"/>
-            <a:ext cx="11731229" cy="2641600"/>
-          </a:xfrm>
           <a:prstGeom prst="rect">
             <a:avLst/>
           </a:prstGeom>
-          <a:ln w="12700">
-            <a:miter lim="400000"/>
-          </a:ln>
-          <a:extLst>
-            <a:ext uri="{C572A759-6A51-4108-AA02-DFA0A04FC94B}">
-              <ma14:wrappingTextBoxFlag xmlns:ma14="http://schemas.microsoft.com/office/mac/drawingml/2011/main" val="1"/>
-            </a:ext>
-          </a:extLst>
         </p:spPr>
         <p:txBody>
-          <a:bodyPr lIns="0" tIns="0" rIns="0" bIns="0">
-            <a:spAutoFit/>
-          </a:bodyPr>
+          <a:bodyPr anchor="t"/>
           <a:lstStyle/>
           <a:p>
-            <a:pPr lvl="0" algn="l">
-              <a:defRPr sz="1800">
-                <a:solidFill>
-                  <a:srgbClr val="000000"/>
-                </a:solidFill>
-              </a:defRPr>
-            </a:pPr>
-            <a:r>
-              <a:rPr sz="3500">
-                <a:solidFill>
-                  <a:srgbClr val="FFFFFF"/>
-                </a:solidFill>
-                <a:latin typeface="Andale Mono"/>
-                <a:ea typeface="Andale Mono"/>
-                <a:cs typeface="Andale Mono"/>
-                <a:sym typeface="Andale Mono"/>
-              </a:rPr>
-              <a:t>sqlCtx &lt;- sparkRSQL.init(sc)</a:t>
-            </a:r>
-            <a:endParaRPr sz="3500">
-              <a:solidFill>
-                <a:srgbClr val="FFFFFF"/>
-              </a:solidFill>
-              <a:latin typeface="Andale Mono"/>
-              <a:ea typeface="Andale Mono"/>
-              <a:cs typeface="Andale Mono"/>
-              <a:sym typeface="Andale Mono"/>
-            </a:endParaRPr>
-          </a:p>
-          <a:p>
-            <a:pPr lvl="0" algn="l">
-              <a:defRPr sz="1800">
-                <a:solidFill>
-                  <a:srgbClr val="000000"/>
-                </a:solidFill>
-              </a:defRPr>
-            </a:pPr>
-            <a:endParaRPr sz="3500">
-              <a:solidFill>
-                <a:srgbClr val="FFFFFF"/>
-              </a:solidFill>
-              <a:latin typeface="Andale Mono"/>
-              <a:ea typeface="Andale Mono"/>
-              <a:cs typeface="Andale Mono"/>
-              <a:sym typeface="Andale Mono"/>
-            </a:endParaRPr>
-          </a:p>
-          <a:p>
-            <a:pPr lvl="0" algn="l">
-              <a:defRPr sz="1800">
-                <a:solidFill>
-                  <a:srgbClr val="000000"/>
-                </a:solidFill>
-              </a:defRPr>
-            </a:pPr>
-            <a:r>
-              <a:rPr sz="3500">
-                <a:solidFill>
-                  <a:srgbClr val="FFFFFF"/>
-                </a:solidFill>
-                <a:latin typeface="Andale Mono"/>
-                <a:ea typeface="Andale Mono"/>
-                <a:cs typeface="Andale Mono"/>
-                <a:sym typeface="Andale Mono"/>
-              </a:rPr>
-              <a:t>df &lt;- jsonFile(sqlCtx, “people.json”)</a:t>
-            </a:r>
-            <a:endParaRPr sz="3500">
-              <a:solidFill>
-                <a:srgbClr val="FFFFFF"/>
-              </a:solidFill>
-              <a:latin typeface="Andale Mono"/>
-              <a:ea typeface="Andale Mono"/>
-              <a:cs typeface="Andale Mono"/>
-              <a:sym typeface="Andale Mono"/>
-            </a:endParaRPr>
-          </a:p>
-          <a:p>
-            <a:pPr lvl="0" algn="l">
-              <a:defRPr sz="1800">
-                <a:solidFill>
-                  <a:srgbClr val="000000"/>
-                </a:solidFill>
-              </a:defRPr>
-            </a:pPr>
-            <a:endParaRPr sz="3500">
-              <a:solidFill>
-                <a:srgbClr val="FFFFFF"/>
-              </a:solidFill>
-              <a:latin typeface="Andale Mono"/>
-              <a:ea typeface="Andale Mono"/>
-              <a:cs typeface="Andale Mono"/>
-              <a:sym typeface="Andale Mono"/>
-            </a:endParaRPr>
+            <a:pPr lvl="0">
+              <a:defRPr sz="1800">
+                <a:solidFill>
+                  <a:srgbClr val="000000"/>
+                </a:solidFill>
+              </a:defRPr>
+            </a:pPr>
+            <a:r>
+              <a:rPr sz="3800">
+                <a:solidFill>
+                  <a:srgbClr val="FFFFFF"/>
+                </a:solidFill>
+              </a:rPr>
+              <a:t>New API for Spark 1.3. Takes the place of SchemaRDDs.</a:t>
+            </a:r>
+            <a:endParaRPr sz="3800">
+              <a:solidFill>
+                <a:srgbClr val="FFFFFF"/>
+              </a:solidFill>
+            </a:endParaRPr>
+          </a:p>
+          <a:p>
+            <a:pPr lvl="0">
+              <a:defRPr sz="1800">
+                <a:solidFill>
+                  <a:srgbClr val="000000"/>
+                </a:solidFill>
+              </a:defRPr>
+            </a:pPr>
+            <a:r>
+              <a:rPr sz="3800">
+                <a:solidFill>
+                  <a:srgbClr val="FFFFFF"/>
+                </a:solidFill>
+              </a:rPr>
+              <a:t>Still provides all of the existing relational database-like features of the SchemaRDD</a:t>
+            </a:r>
+            <a:endParaRPr sz="3800">
+              <a:solidFill>
+                <a:srgbClr val="FFFFFF"/>
+              </a:solidFill>
+            </a:endParaRPr>
+          </a:p>
+          <a:p>
+            <a:pPr lvl="0">
+              <a:defRPr sz="1800">
+                <a:solidFill>
+                  <a:srgbClr val="000000"/>
+                </a:solidFill>
+              </a:defRPr>
+            </a:pPr>
+            <a:r>
+              <a:rPr sz="3800">
+                <a:solidFill>
+                  <a:srgbClr val="FFFFFF"/>
+                </a:solidFill>
+              </a:rPr>
+              <a:t>Adds greater Column accessibility and built-in methods for manipulation and aggregation.</a:t>
+            </a:r>
           </a:p>
         </p:txBody>
       </p:sp>
@@ -4246,7 +4502,7 @@
         <p:spPr>
           <a:xfrm>
             <a:off x="636786" y="2082800"/>
-            <a:ext cx="11731229" cy="3657600"/>
+            <a:ext cx="11731229" cy="2641600"/>
           </a:xfrm>
           <a:prstGeom prst="rect">
             <a:avLst/>
@@ -4332,54 +4588,6 @@
                 <a:sym typeface="Andale Mono"/>
               </a:rPr>
               <a:t>df &lt;- jsonFile(sqlCtx, “people.json”)</a:t>
-            </a:r>
-            <a:endParaRPr sz="3500">
-              <a:solidFill>
-                <a:srgbClr val="FFFFFF"/>
-              </a:solidFill>
-              <a:latin typeface="Andale Mono"/>
-              <a:ea typeface="Andale Mono"/>
-              <a:cs typeface="Andale Mono"/>
-              <a:sym typeface="Andale Mono"/>
-            </a:endParaRPr>
-          </a:p>
-          <a:p>
-            <a:pPr lvl="0" algn="l">
-              <a:defRPr sz="1800">
-                <a:solidFill>
-                  <a:srgbClr val="000000"/>
-                </a:solidFill>
-              </a:defRPr>
-            </a:pPr>
-            <a:endParaRPr sz="3500">
-              <a:solidFill>
-                <a:srgbClr val="FFFFFF"/>
-              </a:solidFill>
-              <a:latin typeface="Andale Mono"/>
-              <a:ea typeface="Andale Mono"/>
-              <a:cs typeface="Andale Mono"/>
-              <a:sym typeface="Andale Mono"/>
-            </a:endParaRPr>
-          </a:p>
-          <a:p>
-            <a:pPr lvl="0" algn="l">
-              <a:defRPr sz="1800">
-                <a:solidFill>
-                  <a:srgbClr val="000000"/>
-                </a:solidFill>
-              </a:defRPr>
-            </a:pPr>
-            <a:r>
-              <a:rPr sz="3500">
-                <a:solidFill>
-                  <a:srgbClr val="FFFFFF"/>
-                </a:solidFill>
-                <a:latin typeface="Andale Mono"/>
-                <a:ea typeface="Andale Mono"/>
-                <a:cs typeface="Andale Mono"/>
-                <a:sym typeface="Andale Mono"/>
-              </a:rPr>
-              <a:t>avg &lt;- select(df, avg(df$age))</a:t>
             </a:r>
             <a:endParaRPr sz="3500">
               <a:solidFill>
@@ -4452,7 +4660,11 @@
         </p:spPr>
         <p:txBody>
           <a:bodyPr/>
-          <a:lstStyle/>
+          <a:lstStyle>
+            <a:lvl1pPr defTabSz="525779">
+              <a:defRPr sz="7200"/>
+            </a:lvl1pPr>
+          </a:lstStyle>
           <a:p>
             <a:pPr lvl="0">
               <a:defRPr sz="1800">
@@ -4462,12 +4674,12 @@
               </a:defRPr>
             </a:pPr>
             <a:r>
-              <a:rPr sz="8000">
-                <a:solidFill>
-                  <a:srgbClr val="FFFFFF"/>
-                </a:solidFill>
-              </a:rPr>
-              <a:t>DataFrame Methods</a:t>
+              <a:rPr sz="7200">
+                <a:solidFill>
+                  <a:srgbClr val="FFFFFF"/>
+                </a:solidFill>
+              </a:rPr>
+              <a:t>Example: Column Average</a:t>
             </a:r>
           </a:p>
         </p:txBody>
@@ -4476,99 +4688,12 @@
         <p:nvSpPr>
           <p:cNvPr id="88" name="Shape 88"/>
           <p:cNvSpPr/>
-          <p:nvPr>
-            <p:ph type="body" idx="1"/>
-          </p:nvPr>
+          <p:nvPr/>
         </p:nvSpPr>
         <p:spPr>
-          <a:prstGeom prst="rect">
-            <a:avLst/>
-          </a:prstGeom>
-        </p:spPr>
-        <p:txBody>
-          <a:bodyPr anchor="t"/>
-          <a:lstStyle/>
-          <a:p>
-            <a:pPr lvl="0">
-              <a:defRPr sz="1800">
-                <a:solidFill>
-                  <a:srgbClr val="000000"/>
-                </a:solidFill>
-              </a:defRPr>
-            </a:pPr>
-            <a:r>
-              <a:rPr sz="3800">
-                <a:solidFill>
-                  <a:srgbClr val="FFFFFF"/>
-                </a:solidFill>
-              </a:rPr>
-              <a:t>‘$’ Column Selector</a:t>
-            </a:r>
-            <a:endParaRPr sz="3800">
-              <a:solidFill>
-                <a:srgbClr val="FFFFFF"/>
-              </a:solidFill>
-            </a:endParaRPr>
-          </a:p>
-          <a:p>
-            <a:pPr lvl="1">
-              <a:defRPr sz="1800">
-                <a:solidFill>
-                  <a:srgbClr val="000000"/>
-                </a:solidFill>
-              </a:defRPr>
-            </a:pPr>
-            <a:r>
-              <a:rPr sz="3800">
-                <a:solidFill>
-                  <a:srgbClr val="FFFFFF"/>
-                </a:solidFill>
-              </a:rPr>
-              <a:t>Use ‘$’ to refer to the columns of a Spark DataFrame just like you would in R.</a:t>
-            </a:r>
-            <a:endParaRPr sz="3800">
-              <a:solidFill>
-                <a:srgbClr val="FFFFFF"/>
-              </a:solidFill>
-            </a:endParaRPr>
-          </a:p>
-          <a:p>
-            <a:pPr lvl="1">
-              <a:defRPr sz="1800">
-                <a:solidFill>
-                  <a:srgbClr val="000000"/>
-                </a:solidFill>
-              </a:defRPr>
-            </a:pPr>
-            <a:r>
-              <a:rPr sz="3800">
-                <a:solidFill>
-                  <a:srgbClr val="FFFFFF"/>
-                </a:solidFill>
-              </a:rPr>
-              <a:t>Even works with tab-completion:</a:t>
-            </a:r>
-          </a:p>
-        </p:txBody>
-      </p:sp>
-      <p:pic>
-        <p:nvPicPr>
-          <p:cNvPr id="89" name="Screen Shot 2015-03-16 at 1.16.32 PM.png"/>
-          <p:cNvPicPr/>
-          <p:nvPr/>
-        </p:nvPicPr>
-        <p:blipFill>
-          <a:blip r:embed="rId2">
-            <a:extLst/>
-          </a:blip>
-          <a:stretch>
-            <a:fillRect/>
-          </a:stretch>
-        </p:blipFill>
-        <p:spPr>
           <a:xfrm>
-            <a:off x="4457700" y="6330950"/>
-            <a:ext cx="4089400" cy="2476500"/>
+            <a:off x="636786" y="2082800"/>
+            <a:ext cx="11731229" cy="3657600"/>
           </a:xfrm>
           <a:prstGeom prst="rect">
             <a:avLst/>
@@ -4576,8 +4701,163 @@
           <a:ln w="12700">
             <a:miter lim="400000"/>
           </a:ln>
+          <a:extLst>
+            <a:ext uri="{C572A759-6A51-4108-AA02-DFA0A04FC94B}">
+              <ma14:wrappingTextBoxFlag xmlns:ma14="http://schemas.microsoft.com/office/mac/drawingml/2011/main" val="1"/>
+            </a:ext>
+          </a:extLst>
         </p:spPr>
-      </p:pic>
+        <p:txBody>
+          <a:bodyPr lIns="0" tIns="0" rIns="0" bIns="0">
+            <a:spAutoFit/>
+          </a:bodyPr>
+          <a:lstStyle/>
+          <a:p>
+            <a:pPr lvl="0" algn="l">
+              <a:defRPr sz="1800">
+                <a:solidFill>
+                  <a:srgbClr val="000000"/>
+                </a:solidFill>
+              </a:defRPr>
+            </a:pPr>
+            <a:r>
+              <a:rPr sz="3500">
+                <a:solidFill>
+                  <a:srgbClr val="FFFFFF"/>
+                </a:solidFill>
+                <a:latin typeface="Andale Mono"/>
+                <a:ea typeface="Andale Mono"/>
+                <a:cs typeface="Andale Mono"/>
+                <a:sym typeface="Andale Mono"/>
+              </a:rPr>
+              <a:t>sqlCtx &lt;- sparkRSQL.init(sc)</a:t>
+            </a:r>
+            <a:endParaRPr sz="3500">
+              <a:solidFill>
+                <a:srgbClr val="FFFFFF"/>
+              </a:solidFill>
+              <a:latin typeface="Andale Mono"/>
+              <a:ea typeface="Andale Mono"/>
+              <a:cs typeface="Andale Mono"/>
+              <a:sym typeface="Andale Mono"/>
+            </a:endParaRPr>
+          </a:p>
+          <a:p>
+            <a:pPr lvl="0" algn="l">
+              <a:defRPr sz="1800">
+                <a:solidFill>
+                  <a:srgbClr val="000000"/>
+                </a:solidFill>
+              </a:defRPr>
+            </a:pPr>
+            <a:endParaRPr sz="3500">
+              <a:solidFill>
+                <a:srgbClr val="FFFFFF"/>
+              </a:solidFill>
+              <a:latin typeface="Andale Mono"/>
+              <a:ea typeface="Andale Mono"/>
+              <a:cs typeface="Andale Mono"/>
+              <a:sym typeface="Andale Mono"/>
+            </a:endParaRPr>
+          </a:p>
+          <a:p>
+            <a:pPr lvl="0" algn="l">
+              <a:defRPr sz="1800">
+                <a:solidFill>
+                  <a:srgbClr val="000000"/>
+                </a:solidFill>
+              </a:defRPr>
+            </a:pPr>
+            <a:r>
+              <a:rPr sz="3500">
+                <a:solidFill>
+                  <a:srgbClr val="FFFFFF"/>
+                </a:solidFill>
+                <a:latin typeface="Andale Mono"/>
+                <a:ea typeface="Andale Mono"/>
+                <a:cs typeface="Andale Mono"/>
+                <a:sym typeface="Andale Mono"/>
+              </a:rPr>
+              <a:t>df &lt;- jsonFile(sqlCtx, “people.json”)</a:t>
+            </a:r>
+            <a:endParaRPr sz="3500">
+              <a:solidFill>
+                <a:srgbClr val="FFFFFF"/>
+              </a:solidFill>
+              <a:latin typeface="Andale Mono"/>
+              <a:ea typeface="Andale Mono"/>
+              <a:cs typeface="Andale Mono"/>
+              <a:sym typeface="Andale Mono"/>
+            </a:endParaRPr>
+          </a:p>
+          <a:p>
+            <a:pPr lvl="0" algn="l">
+              <a:defRPr sz="1800">
+                <a:solidFill>
+                  <a:srgbClr val="000000"/>
+                </a:solidFill>
+              </a:defRPr>
+            </a:pPr>
+            <a:endParaRPr sz="3500">
+              <a:solidFill>
+                <a:srgbClr val="FFFFFF"/>
+              </a:solidFill>
+              <a:latin typeface="Andale Mono"/>
+              <a:ea typeface="Andale Mono"/>
+              <a:cs typeface="Andale Mono"/>
+              <a:sym typeface="Andale Mono"/>
+            </a:endParaRPr>
+          </a:p>
+          <a:p>
+            <a:pPr lvl="0" algn="l">
+              <a:defRPr sz="1800">
+                <a:solidFill>
+                  <a:srgbClr val="000000"/>
+                </a:solidFill>
+              </a:defRPr>
+            </a:pPr>
+            <a:r>
+              <a:rPr sz="3500">
+                <a:solidFill>
+                  <a:srgbClr val="FFFFFF"/>
+                </a:solidFill>
+                <a:latin typeface="Andale Mono"/>
+                <a:ea typeface="Andale Mono"/>
+                <a:cs typeface="Andale Mono"/>
+                <a:sym typeface="Andale Mono"/>
+              </a:rPr>
+              <a:t>avg &lt;- select(df, avg(df$age))</a:t>
+            </a:r>
+            <a:endParaRPr sz="3500">
+              <a:solidFill>
+                <a:srgbClr val="FFFFFF"/>
+              </a:solidFill>
+              <a:latin typeface="Andale Mono"/>
+              <a:ea typeface="Andale Mono"/>
+              <a:cs typeface="Andale Mono"/>
+              <a:sym typeface="Andale Mono"/>
+            </a:endParaRPr>
+          </a:p>
+          <a:p>
+            <a:pPr lvl="0" algn="l">
+              <a:defRPr sz="1800">
+                <a:solidFill>
+                  <a:srgbClr val="000000"/>
+                </a:solidFill>
+              </a:defRPr>
+            </a:pPr>
+            <a:endParaRPr sz="3500">
+              <a:solidFill>
+                <a:srgbClr val="FFFFFF"/>
+              </a:solidFill>
+              <a:latin typeface="Andale Mono"/>
+              <a:ea typeface="Andale Mono"/>
+              <a:cs typeface="Andale Mono"/>
+              <a:sym typeface="Andale Mono"/>
+            </a:endParaRPr>
+          </a:p>
+        </p:txBody>
+      </p:sp>
     </p:spTree>
   </p:cSld>
   <p:clrMapOvr>
@@ -4606,7 +4886,7 @@
       </p:grpSpPr>
       <p:sp>
         <p:nvSpPr>
-          <p:cNvPr id="91" name="Shape 91"/>
+          <p:cNvPr id="90" name="Shape 90"/>
           <p:cNvSpPr/>
           <p:nvPr>
             <p:ph type="title"/>
@@ -4641,7 +4921,7 @@
       </p:sp>
       <p:sp>
         <p:nvSpPr>
-          <p:cNvPr id="92" name="Shape 92"/>
+          <p:cNvPr id="91" name="Shape 91"/>
           <p:cNvSpPr/>
           <p:nvPr>
             <p:ph type="body" idx="1"/>
@@ -4656,328 +4936,95 @@
           <a:bodyPr anchor="t"/>
           <a:lstStyle/>
           <a:p>
-            <a:pPr lvl="0" marL="253364" indent="-253364" defTabSz="332993">
-              <a:spcBef>
-                <a:spcPts val="2300"/>
-              </a:spcBef>
-              <a:defRPr sz="1800">
-                <a:solidFill>
-                  <a:srgbClr val="000000"/>
-                </a:solidFill>
-              </a:defRPr>
-            </a:pPr>
-            <a:r>
-              <a:rPr sz="2280">
-                <a:solidFill>
-                  <a:srgbClr val="FFFFFF"/>
-                </a:solidFill>
-                <a:latin typeface="Helvetica"/>
-                <a:ea typeface="Helvetica"/>
-                <a:cs typeface="Helvetica"/>
-                <a:sym typeface="Helvetica"/>
-              </a:rPr>
-              <a:t>Filter</a:t>
-            </a:r>
-            <a:endParaRPr sz="2280">
-              <a:solidFill>
-                <a:srgbClr val="FFFFFF"/>
-              </a:solidFill>
-              <a:latin typeface="Helvetica"/>
-              <a:ea typeface="Helvetica"/>
-              <a:cs typeface="Helvetica"/>
-              <a:sym typeface="Helvetica"/>
-            </a:endParaRPr>
-          </a:p>
-          <a:p>
-            <a:pPr lvl="1" marL="506729" indent="-253364" defTabSz="332993">
-              <a:spcBef>
-                <a:spcPts val="2300"/>
-              </a:spcBef>
-              <a:defRPr sz="1800">
-                <a:solidFill>
-                  <a:srgbClr val="000000"/>
-                </a:solidFill>
-              </a:defRPr>
-            </a:pPr>
-            <a:r>
-              <a:rPr sz="2280">
-                <a:solidFill>
-                  <a:srgbClr val="FFFFFF"/>
-                </a:solidFill>
-                <a:latin typeface="Andale Mono"/>
-                <a:ea typeface="Andale Mono"/>
-                <a:cs typeface="Andale Mono"/>
-                <a:sym typeface="Andale Mono"/>
-              </a:rPr>
-              <a:t>filter(df, df$col1 &gt; 0)</a:t>
-            </a:r>
-            <a:endParaRPr sz="2280">
-              <a:solidFill>
-                <a:srgbClr val="FFFFFF"/>
-              </a:solidFill>
-              <a:latin typeface="Andale Mono"/>
-              <a:ea typeface="Andale Mono"/>
-              <a:cs typeface="Andale Mono"/>
-              <a:sym typeface="Andale Mono"/>
-            </a:endParaRPr>
-          </a:p>
-          <a:p>
-            <a:pPr lvl="0" marL="253364" indent="-253364" defTabSz="332993">
-              <a:spcBef>
-                <a:spcPts val="2300"/>
-              </a:spcBef>
-              <a:defRPr sz="1800">
-                <a:solidFill>
-                  <a:srgbClr val="000000"/>
-                </a:solidFill>
-              </a:defRPr>
-            </a:pPr>
-            <a:r>
-              <a:rPr sz="2280">
-                <a:solidFill>
-                  <a:srgbClr val="FFFFFF"/>
-                </a:solidFill>
-                <a:latin typeface="Helvetica"/>
-                <a:ea typeface="Helvetica"/>
-                <a:cs typeface="Helvetica"/>
-                <a:sym typeface="Helvetica"/>
-              </a:rPr>
-              <a:t>Sort</a:t>
-            </a:r>
-            <a:endParaRPr sz="2280">
-              <a:solidFill>
-                <a:srgbClr val="FFFFFF"/>
-              </a:solidFill>
-              <a:latin typeface="Helvetica"/>
-              <a:ea typeface="Helvetica"/>
-              <a:cs typeface="Helvetica"/>
-              <a:sym typeface="Helvetica"/>
-            </a:endParaRPr>
-          </a:p>
-          <a:p>
-            <a:pPr lvl="1" marL="506729" indent="-253364" defTabSz="332993">
-              <a:spcBef>
-                <a:spcPts val="2300"/>
-              </a:spcBef>
-              <a:defRPr sz="1800">
-                <a:solidFill>
-                  <a:srgbClr val="000000"/>
-                </a:solidFill>
-              </a:defRPr>
-            </a:pPr>
-            <a:r>
-              <a:rPr sz="2280">
-                <a:solidFill>
-                  <a:srgbClr val="FFFFFF"/>
-                </a:solidFill>
-                <a:latin typeface="Andale Mono"/>
-                <a:ea typeface="Andale Mono"/>
-                <a:cs typeface="Andale Mono"/>
-                <a:sym typeface="Andale Mono"/>
-              </a:rPr>
-              <a:t>sortDF(df, asc(df$col1), desc(abs(df$col2)))</a:t>
-            </a:r>
-            <a:endParaRPr sz="2280">
-              <a:solidFill>
-                <a:srgbClr val="FFFFFF"/>
-              </a:solidFill>
-              <a:latin typeface="Andale Mono"/>
-              <a:ea typeface="Andale Mono"/>
-              <a:cs typeface="Andale Mono"/>
-              <a:sym typeface="Andale Mono"/>
-            </a:endParaRPr>
-          </a:p>
-          <a:p>
-            <a:pPr lvl="0" marL="253364" indent="-253364" defTabSz="332993">
-              <a:spcBef>
-                <a:spcPts val="2300"/>
-              </a:spcBef>
-              <a:defRPr sz="1800">
-                <a:solidFill>
-                  <a:srgbClr val="000000"/>
-                </a:solidFill>
-              </a:defRPr>
-            </a:pPr>
-            <a:r>
-              <a:rPr sz="2280">
-                <a:solidFill>
-                  <a:srgbClr val="FFFFFF"/>
-                </a:solidFill>
-                <a:latin typeface="Helvetica"/>
-                <a:ea typeface="Helvetica"/>
-                <a:cs typeface="Helvetica"/>
-                <a:sym typeface="Helvetica"/>
-              </a:rPr>
-              <a:t>Join</a:t>
-            </a:r>
-            <a:endParaRPr sz="2280">
-              <a:solidFill>
-                <a:srgbClr val="FFFFFF"/>
-              </a:solidFill>
-              <a:latin typeface="Helvetica"/>
-              <a:ea typeface="Helvetica"/>
-              <a:cs typeface="Helvetica"/>
-              <a:sym typeface="Helvetica"/>
-            </a:endParaRPr>
-          </a:p>
-          <a:p>
-            <a:pPr lvl="1" marL="506729" indent="-253364" defTabSz="332993">
-              <a:spcBef>
-                <a:spcPts val="2300"/>
-              </a:spcBef>
-              <a:defRPr sz="1800">
-                <a:solidFill>
-                  <a:srgbClr val="000000"/>
-                </a:solidFill>
-              </a:defRPr>
-            </a:pPr>
-            <a:r>
-              <a:rPr sz="2280">
-                <a:solidFill>
-                  <a:srgbClr val="FFFFFF"/>
-                </a:solidFill>
-                <a:latin typeface="Andale Mono"/>
-                <a:ea typeface="Andale Mono"/>
-                <a:cs typeface="Andale Mono"/>
-                <a:sym typeface="Andale Mono"/>
-              </a:rPr>
-              <a:t>join(df1, df2, df1$col1 == df2$col2, "right_outer")</a:t>
-            </a:r>
-            <a:endParaRPr sz="2280">
-              <a:solidFill>
-                <a:srgbClr val="FFFFFF"/>
-              </a:solidFill>
-              <a:latin typeface="Andale Mono"/>
-              <a:ea typeface="Andale Mono"/>
-              <a:cs typeface="Andale Mono"/>
-              <a:sym typeface="Andale Mono"/>
-            </a:endParaRPr>
-          </a:p>
-          <a:p>
-            <a:pPr lvl="0" marL="253364" indent="-253364" defTabSz="332993">
-              <a:spcBef>
-                <a:spcPts val="2300"/>
-              </a:spcBef>
-              <a:defRPr sz="1800">
-                <a:solidFill>
-                  <a:srgbClr val="000000"/>
-                </a:solidFill>
-              </a:defRPr>
-            </a:pPr>
-            <a:r>
-              <a:rPr sz="2280">
-                <a:solidFill>
-                  <a:srgbClr val="FFFFFF"/>
-                </a:solidFill>
-                <a:latin typeface="Helvetica"/>
-                <a:ea typeface="Helvetica"/>
-                <a:cs typeface="Helvetica"/>
-                <a:sym typeface="Helvetica"/>
-              </a:rPr>
-              <a:t>GroupBy</a:t>
-            </a:r>
-            <a:endParaRPr sz="2280">
-              <a:solidFill>
-                <a:srgbClr val="FFFFFF"/>
-              </a:solidFill>
-              <a:latin typeface="Helvetica"/>
-              <a:ea typeface="Helvetica"/>
-              <a:cs typeface="Helvetica"/>
-              <a:sym typeface="Helvetica"/>
-            </a:endParaRPr>
-          </a:p>
-          <a:p>
-            <a:pPr lvl="1" marL="506729" indent="-253364" defTabSz="332993">
-              <a:spcBef>
-                <a:spcPts val="2300"/>
-              </a:spcBef>
-              <a:defRPr sz="1800">
-                <a:solidFill>
-                  <a:srgbClr val="000000"/>
-                </a:solidFill>
-              </a:defRPr>
-            </a:pPr>
-            <a:r>
-              <a:rPr sz="2280">
-                <a:solidFill>
-                  <a:srgbClr val="FFFFFF"/>
-                </a:solidFill>
-                <a:latin typeface="Andale Mono"/>
-                <a:ea typeface="Andale Mono"/>
-                <a:cs typeface="Andale Mono"/>
-                <a:sym typeface="Andale Mono"/>
-              </a:rPr>
-              <a:t>groupBy(df, df$col1)</a:t>
-            </a:r>
-            <a:endParaRPr sz="2280">
-              <a:solidFill>
-                <a:srgbClr val="FFFFFF"/>
-              </a:solidFill>
-              <a:latin typeface="Andale Mono"/>
-              <a:ea typeface="Andale Mono"/>
-              <a:cs typeface="Andale Mono"/>
-              <a:sym typeface="Andale Mono"/>
-            </a:endParaRPr>
-          </a:p>
-          <a:p>
-            <a:pPr lvl="0" marL="253364" indent="-253364" defTabSz="332993">
-              <a:spcBef>
-                <a:spcPts val="2300"/>
-              </a:spcBef>
-              <a:defRPr sz="1800">
-                <a:solidFill>
-                  <a:srgbClr val="000000"/>
-                </a:solidFill>
-              </a:defRPr>
-            </a:pPr>
-            <a:r>
-              <a:rPr sz="2280">
-                <a:solidFill>
-                  <a:srgbClr val="FFFFFF"/>
-                </a:solidFill>
-                <a:latin typeface="Helvetica"/>
-                <a:ea typeface="Helvetica"/>
-                <a:cs typeface="Helvetica"/>
-                <a:sym typeface="Helvetica"/>
-              </a:rPr>
-              <a:t>Agg</a:t>
-            </a:r>
-            <a:endParaRPr sz="2280">
-              <a:solidFill>
-                <a:srgbClr val="FFFFFF"/>
-              </a:solidFill>
-              <a:latin typeface="Helvetica"/>
-              <a:ea typeface="Helvetica"/>
-              <a:cs typeface="Helvetica"/>
-              <a:sym typeface="Helvetica"/>
-            </a:endParaRPr>
-          </a:p>
-          <a:p>
-            <a:pPr lvl="1" marL="506729" indent="-253364" defTabSz="332993">
-              <a:spcBef>
-                <a:spcPts val="2300"/>
-              </a:spcBef>
-              <a:defRPr sz="1800">
-                <a:solidFill>
-                  <a:srgbClr val="000000"/>
-                </a:solidFill>
-              </a:defRPr>
-            </a:pPr>
-            <a:r>
-              <a:rPr sz="2280">
-                <a:solidFill>
-                  <a:srgbClr val="FFFFFF"/>
-                </a:solidFill>
-                <a:latin typeface="Andale Mono"/>
-                <a:ea typeface="Andale Mono"/>
-                <a:cs typeface="Andale Mono"/>
-                <a:sym typeface="Andale Mono"/>
-              </a:rPr>
-              <a:t>agg(groupDF, sum(groupDF$col2), max(groupDF$col3))</a:t>
+            <a:pPr lvl="0">
+              <a:defRPr sz="1800">
+                <a:solidFill>
+                  <a:srgbClr val="000000"/>
+                </a:solidFill>
+              </a:defRPr>
+            </a:pPr>
+            <a:r>
+              <a:rPr sz="3800">
+                <a:solidFill>
+                  <a:srgbClr val="FFFFFF"/>
+                </a:solidFill>
+              </a:rPr>
+              <a:t>‘$’ Column Selector</a:t>
+            </a:r>
+            <a:endParaRPr sz="3800">
+              <a:solidFill>
+                <a:srgbClr val="FFFFFF"/>
+              </a:solidFill>
+            </a:endParaRPr>
+          </a:p>
+          <a:p>
+            <a:pPr lvl="1">
+              <a:defRPr sz="1800">
+                <a:solidFill>
+                  <a:srgbClr val="000000"/>
+                </a:solidFill>
+              </a:defRPr>
+            </a:pPr>
+            <a:r>
+              <a:rPr sz="3800">
+                <a:solidFill>
+                  <a:srgbClr val="FFFFFF"/>
+                </a:solidFill>
+              </a:rPr>
+              <a:t>Use ‘$’ to refer to the columns of a Spark DataFrame just like you would in R.</a:t>
+            </a:r>
+            <a:endParaRPr sz="3800">
+              <a:solidFill>
+                <a:srgbClr val="FFFFFF"/>
+              </a:solidFill>
+            </a:endParaRPr>
+          </a:p>
+          <a:p>
+            <a:pPr lvl="1">
+              <a:defRPr sz="1800">
+                <a:solidFill>
+                  <a:srgbClr val="000000"/>
+                </a:solidFill>
+              </a:defRPr>
+            </a:pPr>
+            <a:r>
+              <a:rPr sz="3800">
+                <a:solidFill>
+                  <a:srgbClr val="FFFFFF"/>
+                </a:solidFill>
+              </a:rPr>
+              <a:t>Even works with tab-completion:</a:t>
             </a:r>
           </a:p>
         </p:txBody>
       </p:sp>
+      <p:pic>
+        <p:nvPicPr>
+          <p:cNvPr id="92" name="Screen Shot 2015-03-16 at 1.16.32 PM.png"/>
+          <p:cNvPicPr/>
+          <p:nvPr/>
+        </p:nvPicPr>
+        <p:blipFill>
+          <a:blip r:embed="rId2">
+            <a:extLst/>
+          </a:blip>
+          <a:stretch>
+            <a:fillRect/>
+          </a:stretch>
+        </p:blipFill>
+        <p:spPr>
+          <a:xfrm>
+            <a:off x="4457700" y="6330950"/>
+            <a:ext cx="4089400" cy="2476500"/>
+          </a:xfrm>
+          <a:prstGeom prst="rect">
+            <a:avLst/>
+          </a:prstGeom>
+          <a:ln w="12700">
+            <a:miter lim="400000"/>
+          </a:ln>
+        </p:spPr>
+      </p:pic>
     </p:spTree>
   </p:cSld>
   <p:clrMapOvr>
@@ -5034,7 +5081,346 @@
                   <a:srgbClr val="FFFFFF"/>
                 </a:solidFill>
               </a:rPr>
-              <a:t>Demo: Predicting Customer Behavior </a:t>
+              <a:t>DataFrame Methods</a:t>
+            </a:r>
+          </a:p>
+        </p:txBody>
+      </p:sp>
+      <p:sp>
+        <p:nvSpPr>
+          <p:cNvPr id="95" name="Shape 95"/>
+          <p:cNvSpPr/>
+          <p:nvPr>
+            <p:ph type="body" idx="1"/>
+          </p:nvPr>
+        </p:nvSpPr>
+        <p:spPr>
+          <a:prstGeom prst="rect">
+            <a:avLst/>
+          </a:prstGeom>
+        </p:spPr>
+        <p:txBody>
+          <a:bodyPr anchor="t"/>
+          <a:lstStyle/>
+          <a:p>
+            <a:pPr lvl="0" marL="253364" indent="-253364" defTabSz="332993">
+              <a:spcBef>
+                <a:spcPts val="2300"/>
+              </a:spcBef>
+              <a:defRPr sz="1800">
+                <a:solidFill>
+                  <a:srgbClr val="000000"/>
+                </a:solidFill>
+              </a:defRPr>
+            </a:pPr>
+            <a:r>
+              <a:rPr sz="2280">
+                <a:solidFill>
+                  <a:srgbClr val="FFFFFF"/>
+                </a:solidFill>
+                <a:latin typeface="Helvetica"/>
+                <a:ea typeface="Helvetica"/>
+                <a:cs typeface="Helvetica"/>
+                <a:sym typeface="Helvetica"/>
+              </a:rPr>
+              <a:t>Filter</a:t>
+            </a:r>
+            <a:endParaRPr sz="2280">
+              <a:solidFill>
+                <a:srgbClr val="FFFFFF"/>
+              </a:solidFill>
+              <a:latin typeface="Helvetica"/>
+              <a:ea typeface="Helvetica"/>
+              <a:cs typeface="Helvetica"/>
+              <a:sym typeface="Helvetica"/>
+            </a:endParaRPr>
+          </a:p>
+          <a:p>
+            <a:pPr lvl="1" marL="506729" indent="-253364" defTabSz="332993">
+              <a:spcBef>
+                <a:spcPts val="2300"/>
+              </a:spcBef>
+              <a:defRPr sz="1800">
+                <a:solidFill>
+                  <a:srgbClr val="000000"/>
+                </a:solidFill>
+              </a:defRPr>
+            </a:pPr>
+            <a:r>
+              <a:rPr sz="2280">
+                <a:solidFill>
+                  <a:srgbClr val="FFFFFF"/>
+                </a:solidFill>
+                <a:latin typeface="Andale Mono"/>
+                <a:ea typeface="Andale Mono"/>
+                <a:cs typeface="Andale Mono"/>
+                <a:sym typeface="Andale Mono"/>
+              </a:rPr>
+              <a:t>filter(df, df$col1 &gt; 0)</a:t>
+            </a:r>
+            <a:endParaRPr sz="2280">
+              <a:solidFill>
+                <a:srgbClr val="FFFFFF"/>
+              </a:solidFill>
+              <a:latin typeface="Andale Mono"/>
+              <a:ea typeface="Andale Mono"/>
+              <a:cs typeface="Andale Mono"/>
+              <a:sym typeface="Andale Mono"/>
+            </a:endParaRPr>
+          </a:p>
+          <a:p>
+            <a:pPr lvl="0" marL="253364" indent="-253364" defTabSz="332993">
+              <a:spcBef>
+                <a:spcPts val="2300"/>
+              </a:spcBef>
+              <a:defRPr sz="1800">
+                <a:solidFill>
+                  <a:srgbClr val="000000"/>
+                </a:solidFill>
+              </a:defRPr>
+            </a:pPr>
+            <a:r>
+              <a:rPr sz="2280">
+                <a:solidFill>
+                  <a:srgbClr val="FFFFFF"/>
+                </a:solidFill>
+                <a:latin typeface="Helvetica"/>
+                <a:ea typeface="Helvetica"/>
+                <a:cs typeface="Helvetica"/>
+                <a:sym typeface="Helvetica"/>
+              </a:rPr>
+              <a:t>Sort</a:t>
+            </a:r>
+            <a:endParaRPr sz="2280">
+              <a:solidFill>
+                <a:srgbClr val="FFFFFF"/>
+              </a:solidFill>
+              <a:latin typeface="Helvetica"/>
+              <a:ea typeface="Helvetica"/>
+              <a:cs typeface="Helvetica"/>
+              <a:sym typeface="Helvetica"/>
+            </a:endParaRPr>
+          </a:p>
+          <a:p>
+            <a:pPr lvl="1" marL="506729" indent="-253364" defTabSz="332993">
+              <a:spcBef>
+                <a:spcPts val="2300"/>
+              </a:spcBef>
+              <a:defRPr sz="1800">
+                <a:solidFill>
+                  <a:srgbClr val="000000"/>
+                </a:solidFill>
+              </a:defRPr>
+            </a:pPr>
+            <a:r>
+              <a:rPr sz="2280">
+                <a:solidFill>
+                  <a:srgbClr val="FFFFFF"/>
+                </a:solidFill>
+                <a:latin typeface="Andale Mono"/>
+                <a:ea typeface="Andale Mono"/>
+                <a:cs typeface="Andale Mono"/>
+                <a:sym typeface="Andale Mono"/>
+              </a:rPr>
+              <a:t>sortDF(df, asc(df$col1), desc(abs(df$col2)))</a:t>
+            </a:r>
+            <a:endParaRPr sz="2280">
+              <a:solidFill>
+                <a:srgbClr val="FFFFFF"/>
+              </a:solidFill>
+              <a:latin typeface="Andale Mono"/>
+              <a:ea typeface="Andale Mono"/>
+              <a:cs typeface="Andale Mono"/>
+              <a:sym typeface="Andale Mono"/>
+            </a:endParaRPr>
+          </a:p>
+          <a:p>
+            <a:pPr lvl="0" marL="253364" indent="-253364" defTabSz="332993">
+              <a:spcBef>
+                <a:spcPts val="2300"/>
+              </a:spcBef>
+              <a:defRPr sz="1800">
+                <a:solidFill>
+                  <a:srgbClr val="000000"/>
+                </a:solidFill>
+              </a:defRPr>
+            </a:pPr>
+            <a:r>
+              <a:rPr sz="2280">
+                <a:solidFill>
+                  <a:srgbClr val="FFFFFF"/>
+                </a:solidFill>
+                <a:latin typeface="Helvetica"/>
+                <a:ea typeface="Helvetica"/>
+                <a:cs typeface="Helvetica"/>
+                <a:sym typeface="Helvetica"/>
+              </a:rPr>
+              <a:t>Join</a:t>
+            </a:r>
+            <a:endParaRPr sz="2280">
+              <a:solidFill>
+                <a:srgbClr val="FFFFFF"/>
+              </a:solidFill>
+              <a:latin typeface="Helvetica"/>
+              <a:ea typeface="Helvetica"/>
+              <a:cs typeface="Helvetica"/>
+              <a:sym typeface="Helvetica"/>
+            </a:endParaRPr>
+          </a:p>
+          <a:p>
+            <a:pPr lvl="1" marL="506729" indent="-253364" defTabSz="332993">
+              <a:spcBef>
+                <a:spcPts val="2300"/>
+              </a:spcBef>
+              <a:defRPr sz="1800">
+                <a:solidFill>
+                  <a:srgbClr val="000000"/>
+                </a:solidFill>
+              </a:defRPr>
+            </a:pPr>
+            <a:r>
+              <a:rPr sz="2280">
+                <a:solidFill>
+                  <a:srgbClr val="FFFFFF"/>
+                </a:solidFill>
+                <a:latin typeface="Andale Mono"/>
+                <a:ea typeface="Andale Mono"/>
+                <a:cs typeface="Andale Mono"/>
+                <a:sym typeface="Andale Mono"/>
+              </a:rPr>
+              <a:t>join(df1, df2, df1$col1 == df2$col2, "right_outer")</a:t>
+            </a:r>
+            <a:endParaRPr sz="2280">
+              <a:solidFill>
+                <a:srgbClr val="FFFFFF"/>
+              </a:solidFill>
+              <a:latin typeface="Andale Mono"/>
+              <a:ea typeface="Andale Mono"/>
+              <a:cs typeface="Andale Mono"/>
+              <a:sym typeface="Andale Mono"/>
+            </a:endParaRPr>
+          </a:p>
+          <a:p>
+            <a:pPr lvl="0" marL="253364" indent="-253364" defTabSz="332993">
+              <a:spcBef>
+                <a:spcPts val="2300"/>
+              </a:spcBef>
+              <a:defRPr sz="1800">
+                <a:solidFill>
+                  <a:srgbClr val="000000"/>
+                </a:solidFill>
+              </a:defRPr>
+            </a:pPr>
+            <a:r>
+              <a:rPr sz="2280">
+                <a:solidFill>
+                  <a:srgbClr val="FFFFFF"/>
+                </a:solidFill>
+                <a:latin typeface="Helvetica"/>
+                <a:ea typeface="Helvetica"/>
+                <a:cs typeface="Helvetica"/>
+                <a:sym typeface="Helvetica"/>
+              </a:rPr>
+              <a:t>GroupBy</a:t>
+            </a:r>
+            <a:endParaRPr sz="2280">
+              <a:solidFill>
+                <a:srgbClr val="FFFFFF"/>
+              </a:solidFill>
+              <a:latin typeface="Helvetica"/>
+              <a:ea typeface="Helvetica"/>
+              <a:cs typeface="Helvetica"/>
+              <a:sym typeface="Helvetica"/>
+            </a:endParaRPr>
+          </a:p>
+          <a:p>
+            <a:pPr lvl="1" marL="506729" indent="-253364" defTabSz="332993">
+              <a:spcBef>
+                <a:spcPts val="2300"/>
+              </a:spcBef>
+              <a:defRPr sz="1800">
+                <a:solidFill>
+                  <a:srgbClr val="000000"/>
+                </a:solidFill>
+              </a:defRPr>
+            </a:pPr>
+            <a:r>
+              <a:rPr sz="2280">
+                <a:solidFill>
+                  <a:srgbClr val="FFFFFF"/>
+                </a:solidFill>
+                <a:latin typeface="Andale Mono"/>
+                <a:ea typeface="Andale Mono"/>
+                <a:cs typeface="Andale Mono"/>
+                <a:sym typeface="Andale Mono"/>
+              </a:rPr>
+              <a:t>groupBy(df, df$col1)</a:t>
+            </a:r>
+            <a:endParaRPr sz="2280">
+              <a:solidFill>
+                <a:srgbClr val="FFFFFF"/>
+              </a:solidFill>
+              <a:latin typeface="Andale Mono"/>
+              <a:ea typeface="Andale Mono"/>
+              <a:cs typeface="Andale Mono"/>
+              <a:sym typeface="Andale Mono"/>
+            </a:endParaRPr>
+          </a:p>
+          <a:p>
+            <a:pPr lvl="0" marL="253364" indent="-253364" defTabSz="332993">
+              <a:spcBef>
+                <a:spcPts val="2300"/>
+              </a:spcBef>
+              <a:defRPr sz="1800">
+                <a:solidFill>
+                  <a:srgbClr val="000000"/>
+                </a:solidFill>
+              </a:defRPr>
+            </a:pPr>
+            <a:r>
+              <a:rPr sz="2280">
+                <a:solidFill>
+                  <a:srgbClr val="FFFFFF"/>
+                </a:solidFill>
+                <a:latin typeface="Helvetica"/>
+                <a:ea typeface="Helvetica"/>
+                <a:cs typeface="Helvetica"/>
+                <a:sym typeface="Helvetica"/>
+              </a:rPr>
+              <a:t>Agg</a:t>
+            </a:r>
+            <a:endParaRPr sz="2280">
+              <a:solidFill>
+                <a:srgbClr val="FFFFFF"/>
+              </a:solidFill>
+              <a:latin typeface="Helvetica"/>
+              <a:ea typeface="Helvetica"/>
+              <a:cs typeface="Helvetica"/>
+              <a:sym typeface="Helvetica"/>
+            </a:endParaRPr>
+          </a:p>
+          <a:p>
+            <a:pPr lvl="1" marL="506729" indent="-253364" defTabSz="332993">
+              <a:spcBef>
+                <a:spcPts val="2300"/>
+              </a:spcBef>
+              <a:defRPr sz="1800">
+                <a:solidFill>
+                  <a:srgbClr val="000000"/>
+                </a:solidFill>
+              </a:defRPr>
+            </a:pPr>
+            <a:r>
+              <a:rPr sz="2280">
+                <a:solidFill>
+                  <a:srgbClr val="FFFFFF"/>
+                </a:solidFill>
+                <a:latin typeface="Andale Mono"/>
+                <a:ea typeface="Andale Mono"/>
+                <a:cs typeface="Andale Mono"/>
+                <a:sym typeface="Andale Mono"/>
+              </a:rPr>
+              <a:t>agg(groupDF, sum(groupDF$col2), max(groupDF$col3))</a:t>
             </a:r>
           </a:p>
         </p:txBody>
@@ -5288,7 +5674,7 @@
       </p:grpSpPr>
       <p:sp>
         <p:nvSpPr>
-          <p:cNvPr id="96" name="Shape 96"/>
+          <p:cNvPr id="97" name="Shape 97"/>
           <p:cNvSpPr/>
           <p:nvPr>
             <p:ph type="title"/>
@@ -5316,130 +5702,7 @@
                   <a:srgbClr val="FFFFFF"/>
                 </a:solidFill>
               </a:rPr>
-              <a:t>The Problem</a:t>
-            </a:r>
-          </a:p>
-        </p:txBody>
-      </p:sp>
-      <p:sp>
-        <p:nvSpPr>
-          <p:cNvPr id="97" name="Shape 97"/>
-          <p:cNvSpPr/>
-          <p:nvPr>
-            <p:ph type="body" idx="1"/>
-          </p:nvPr>
-        </p:nvSpPr>
-        <p:spPr>
-          <a:prstGeom prst="rect">
-            <a:avLst/>
-          </a:prstGeom>
-        </p:spPr>
-        <p:txBody>
-          <a:bodyPr anchor="t"/>
-          <a:lstStyle/>
-          <a:p>
-            <a:pPr lvl="0">
-              <a:defRPr sz="1800">
-                <a:solidFill>
-                  <a:srgbClr val="000000"/>
-                </a:solidFill>
-              </a:defRPr>
-            </a:pPr>
-            <a:r>
-              <a:rPr sz="3800">
-                <a:solidFill>
-                  <a:srgbClr val="FFFFFF"/>
-                </a:solidFill>
-              </a:rPr>
-              <a:t>3 datasets:</a:t>
-            </a:r>
-            <a:endParaRPr sz="3800">
-              <a:solidFill>
-                <a:srgbClr val="FFFFFF"/>
-              </a:solidFill>
-            </a:endParaRPr>
-          </a:p>
-          <a:p>
-            <a:pPr lvl="1">
-              <a:defRPr sz="1800">
-                <a:solidFill>
-                  <a:srgbClr val="000000"/>
-                </a:solidFill>
-              </a:defRPr>
-            </a:pPr>
-            <a:r>
-              <a:rPr sz="3800">
-                <a:solidFill>
-                  <a:srgbClr val="FFFFFF"/>
-                </a:solidFill>
-              </a:rPr>
-              <a:t>Transactions</a:t>
-            </a:r>
-            <a:endParaRPr sz="3800">
-              <a:solidFill>
-                <a:srgbClr val="FFFFFF"/>
-              </a:solidFill>
-            </a:endParaRPr>
-          </a:p>
-          <a:p>
-            <a:pPr lvl="1">
-              <a:defRPr sz="1800">
-                <a:solidFill>
-                  <a:srgbClr val="000000"/>
-                </a:solidFill>
-              </a:defRPr>
-            </a:pPr>
-            <a:r>
-              <a:rPr sz="3800">
-                <a:solidFill>
-                  <a:srgbClr val="FFFFFF"/>
-                </a:solidFill>
-              </a:rPr>
-              <a:t>Demographic Info Per Customer</a:t>
-            </a:r>
-            <a:endParaRPr sz="3800">
-              <a:solidFill>
-                <a:srgbClr val="FFFFFF"/>
-              </a:solidFill>
-            </a:endParaRPr>
-          </a:p>
-          <a:p>
-            <a:pPr lvl="1">
-              <a:defRPr sz="1800">
-                <a:solidFill>
-                  <a:srgbClr val="000000"/>
-                </a:solidFill>
-              </a:defRPr>
-            </a:pPr>
-            <a:r>
-              <a:rPr sz="3800">
-                <a:solidFill>
-                  <a:srgbClr val="FFFFFF"/>
-                </a:solidFill>
-              </a:rPr>
-              <a:t>DM Treatment Sample</a:t>
-            </a:r>
-            <a:endParaRPr sz="3800">
-              <a:solidFill>
-                <a:srgbClr val="FFFFFF"/>
-              </a:solidFill>
-            </a:endParaRPr>
-          </a:p>
-          <a:p>
-            <a:pPr lvl="0">
-              <a:defRPr sz="1800">
-                <a:solidFill>
-                  <a:srgbClr val="000000"/>
-                </a:solidFill>
-              </a:defRPr>
-            </a:pPr>
-            <a:r>
-              <a:rPr sz="3800">
-                <a:solidFill>
-                  <a:srgbClr val="FFFFFF"/>
-                </a:solidFill>
-              </a:rPr>
-              <a:t>How do we decide who to send the offer to?</a:t>
+              <a:t>Demo: Predicting Customer Behavior </a:t>
             </a:r>
           </a:p>
         </p:txBody>
@@ -5500,7 +5763,7 @@
                   <a:srgbClr val="FFFFFF"/>
                 </a:solidFill>
               </a:rPr>
-              <a:t>The Solution</a:t>
+              <a:t>The Problem</a:t>
             </a:r>
           </a:p>
         </p:txBody>
@@ -5514,10 +5777,6 @@
           </p:nvPr>
         </p:nvSpPr>
         <p:spPr>
-          <a:xfrm>
-            <a:off x="952500" y="2222500"/>
-            <a:ext cx="11099800" cy="6286500"/>
-          </a:xfrm>
           <a:prstGeom prst="rect">
             <a:avLst/>
           </a:prstGeom>
@@ -5539,7 +5798,7 @@
                   <a:srgbClr val="FFFFFF"/>
                 </a:solidFill>
               </a:rPr>
-              <a:t>Use the DataFrame API to prepare and combine all 3 datasets and create an estimation set.</a:t>
+              <a:t>3 datasets:</a:t>
             </a:r>
             <a:endParaRPr sz="3800">
               <a:solidFill>
@@ -5548,6 +5807,72 @@
             </a:endParaRPr>
           </a:p>
           <a:p>
+            <a:pPr lvl="1">
+              <a:defRPr sz="1800">
+                <a:solidFill>
+                  <a:srgbClr val="000000"/>
+                </a:solidFill>
+              </a:defRPr>
+            </a:pPr>
+            <a:r>
+              <a:rPr sz="3800">
+                <a:solidFill>
+                  <a:srgbClr val="FFFFFF"/>
+                </a:solidFill>
+              </a:rPr>
+              <a:t>Transactions</a:t>
+            </a:r>
+            <a:endParaRPr sz="3800">
+              <a:solidFill>
+                <a:srgbClr val="FFFFFF"/>
+              </a:solidFill>
+            </a:endParaRPr>
+          </a:p>
+          <a:p>
+            <a:pPr lvl="1">
+              <a:defRPr sz="1800">
+                <a:solidFill>
+                  <a:srgbClr val="000000"/>
+                </a:solidFill>
+              </a:defRPr>
+            </a:pPr>
+            <a:r>
+              <a:rPr sz="3800">
+                <a:solidFill>
+                  <a:srgbClr val="FFFFFF"/>
+                </a:solidFill>
+              </a:rPr>
+              <a:t>Demographic Info Per Customer</a:t>
+            </a:r>
+            <a:endParaRPr sz="3800">
+              <a:solidFill>
+                <a:srgbClr val="FFFFFF"/>
+              </a:solidFill>
+            </a:endParaRPr>
+          </a:p>
+          <a:p>
+            <a:pPr lvl="1">
+              <a:defRPr sz="1800">
+                <a:solidFill>
+                  <a:srgbClr val="000000"/>
+                </a:solidFill>
+              </a:defRPr>
+            </a:pPr>
+            <a:r>
+              <a:rPr sz="3800">
+                <a:solidFill>
+                  <a:srgbClr val="FFFFFF"/>
+                </a:solidFill>
+              </a:rPr>
+              <a:t>DM Treatment Sample</a:t>
+            </a:r>
+            <a:endParaRPr sz="3800">
+              <a:solidFill>
+                <a:srgbClr val="FFFFFF"/>
+              </a:solidFill>
+            </a:endParaRPr>
+          </a:p>
+          <a:p>
             <a:pPr lvl="0">
               <a:defRPr sz="1800">
                 <a:solidFill>
@@ -5561,51 +5886,7 @@
                   <a:srgbClr val="FFFFFF"/>
                 </a:solidFill>
               </a:rPr>
-              <a:t>Use R’s glm method to train a logistic regression model on the treatment sample</a:t>
-            </a:r>
-            <a:endParaRPr sz="3800">
-              <a:solidFill>
-                <a:srgbClr val="FFFFFF"/>
-              </a:solidFill>
-            </a:endParaRPr>
-          </a:p>
-          <a:p>
-            <a:pPr lvl="0">
-              <a:defRPr sz="1800">
-                <a:solidFill>
-                  <a:srgbClr val="000000"/>
-                </a:solidFill>
-              </a:defRPr>
-            </a:pPr>
-            <a:r>
-              <a:rPr sz="3800">
-                <a:solidFill>
-                  <a:srgbClr val="FFFFFF"/>
-                </a:solidFill>
-              </a:rPr>
-              <a:t>????</a:t>
-            </a:r>
-            <a:endParaRPr sz="3800">
-              <a:solidFill>
-                <a:srgbClr val="FFFFFF"/>
-              </a:solidFill>
-            </a:endParaRPr>
-          </a:p>
-          <a:p>
-            <a:pPr lvl="0">
-              <a:defRPr sz="1800">
-                <a:solidFill>
-                  <a:srgbClr val="000000"/>
-                </a:solidFill>
-              </a:defRPr>
-            </a:pPr>
-            <a:r>
-              <a:rPr sz="3800">
-                <a:solidFill>
-                  <a:srgbClr val="FFFFFF"/>
-                </a:solidFill>
-              </a:rPr>
-              <a:t>Profit!</a:t>
+              <a:t>How do we decide who to send the offer to?</a:t>
             </a:r>
           </a:p>
         </p:txBody>
@@ -5666,7 +5947,112 @@
                   <a:srgbClr val="FFFFFF"/>
                 </a:solidFill>
               </a:rPr>
-              <a:t>Live Demo</a:t>
+              <a:t>The Solution</a:t>
+            </a:r>
+          </a:p>
+        </p:txBody>
+      </p:sp>
+      <p:sp>
+        <p:nvSpPr>
+          <p:cNvPr id="103" name="Shape 103"/>
+          <p:cNvSpPr/>
+          <p:nvPr>
+            <p:ph type="body" idx="1"/>
+          </p:nvPr>
+        </p:nvSpPr>
+        <p:spPr>
+          <a:xfrm>
+            <a:off x="952500" y="2222500"/>
+            <a:ext cx="11099800" cy="6286500"/>
+          </a:xfrm>
+          <a:prstGeom prst="rect">
+            <a:avLst/>
+          </a:prstGeom>
+        </p:spPr>
+        <p:txBody>
+          <a:bodyPr anchor="t"/>
+          <a:lstStyle/>
+          <a:p>
+            <a:pPr lvl="0">
+              <a:defRPr sz="1800">
+                <a:solidFill>
+                  <a:srgbClr val="000000"/>
+                </a:solidFill>
+              </a:defRPr>
+            </a:pPr>
+            <a:r>
+              <a:rPr sz="3800">
+                <a:solidFill>
+                  <a:srgbClr val="FFFFFF"/>
+                </a:solidFill>
+              </a:rPr>
+              <a:t>Use the DataFrame API to load, prepare and combine all 3 datasets and create training and estimation sets.</a:t>
+            </a:r>
+            <a:endParaRPr sz="3800">
+              <a:solidFill>
+                <a:srgbClr val="FFFFFF"/>
+              </a:solidFill>
+            </a:endParaRPr>
+          </a:p>
+          <a:p>
+            <a:pPr lvl="0">
+              <a:defRPr sz="1800">
+                <a:solidFill>
+                  <a:srgbClr val="000000"/>
+                </a:solidFill>
+              </a:defRPr>
+            </a:pPr>
+            <a:r>
+              <a:rPr sz="3800">
+                <a:solidFill>
+                  <a:srgbClr val="FFFFFF"/>
+                </a:solidFill>
+              </a:rPr>
+              <a:t>Use R’s glm method to train a logistic regression model on the treatment sample</a:t>
+            </a:r>
+            <a:endParaRPr sz="3800">
+              <a:solidFill>
+                <a:srgbClr val="FFFFFF"/>
+              </a:solidFill>
+            </a:endParaRPr>
+          </a:p>
+          <a:p>
+            <a:pPr lvl="0">
+              <a:defRPr sz="1800">
+                <a:solidFill>
+                  <a:srgbClr val="000000"/>
+                </a:solidFill>
+              </a:defRPr>
+            </a:pPr>
+            <a:r>
+              <a:rPr sz="3800">
+                <a:solidFill>
+                  <a:srgbClr val="FFFFFF"/>
+                </a:solidFill>
+              </a:rPr>
+              <a:t>????</a:t>
+            </a:r>
+            <a:endParaRPr sz="3800">
+              <a:solidFill>
+                <a:srgbClr val="FFFFFF"/>
+              </a:solidFill>
+            </a:endParaRPr>
+          </a:p>
+          <a:p>
+            <a:pPr lvl="0">
+              <a:defRPr sz="1800">
+                <a:solidFill>
+                  <a:srgbClr val="000000"/>
+                </a:solidFill>
+              </a:defRPr>
+            </a:pPr>
+            <a:r>
+              <a:rPr sz="3800">
+                <a:solidFill>
+                  <a:srgbClr val="FFFFFF"/>
+                </a:solidFill>
+              </a:rPr>
+              <a:t>Profit!</a:t>
             </a:r>
           </a:p>
         </p:txBody>
@@ -5699,7 +6085,7 @@
       </p:grpSpPr>
       <p:sp>
         <p:nvSpPr>
-          <p:cNvPr id="104" name="Shape 104"/>
+          <p:cNvPr id="105" name="Shape 105"/>
           <p:cNvSpPr/>
           <p:nvPr>
             <p:ph type="title"/>
@@ -5727,6 +6113,67 @@
                   <a:srgbClr val="FFFFFF"/>
                 </a:solidFill>
               </a:rPr>
+              <a:t>Live Demo</a:t>
+            </a:r>
+          </a:p>
+        </p:txBody>
+      </p:sp>
+    </p:spTree>
+  </p:cSld>
+  <p:clrMapOvr>
+    <a:masterClrMapping/>
+  </p:clrMapOvr>
+  <p:transition spd="med" advClick="1"/>
+</p:sld>
+</file>
+
+<file path=ppt/slides/slide24.xml><?xml version="1.0" encoding="utf-8"?>
+<p:sld xmlns:a="http://schemas.openxmlformats.org/drawingml/2006/main" xmlns:r="http://schemas.openxmlformats.org/officeDocument/2006/relationships" xmlns:p="http://schemas.openxmlformats.org/presentationml/2006/main" showMasterSp="1" showMasterPhAnim="1">
+  <p:cSld>
+    <p:spTree>
+      <p:nvGrpSpPr>
+        <p:cNvPr id="1" name=""/>
+        <p:cNvGrpSpPr/>
+        <p:nvPr/>
+      </p:nvGrpSpPr>
+      <p:grpSpPr>
+        <a:xfrm>
+          <a:off x="0" y="0"/>
+          <a:ext cx="0" cy="0"/>
+          <a:chOff x="0" y="0"/>
+          <a:chExt cx="0" cy="0"/>
+        </a:xfrm>
+      </p:grpSpPr>
+      <p:sp>
+        <p:nvSpPr>
+          <p:cNvPr id="107" name="Shape 107"/>
+          <p:cNvSpPr/>
+          <p:nvPr>
+            <p:ph type="title"/>
+          </p:nvPr>
+        </p:nvSpPr>
+        <p:spPr>
+          <a:prstGeom prst="rect">
+            <a:avLst/>
+          </a:prstGeom>
+        </p:spPr>
+        <p:txBody>
+          <a:bodyPr/>
+          <a:lstStyle/>
+          <a:p>
+            <a:pPr lvl="0">
+              <a:defRPr sz="1800">
+                <a:solidFill>
+                  <a:srgbClr val="000000"/>
+                </a:solidFill>
+              </a:defRPr>
+            </a:pPr>
+            <a:r>
+              <a:rPr sz="8000">
+                <a:solidFill>
+                  <a:srgbClr val="FFFFFF"/>
+                </a:solidFill>
+              </a:rPr>
               <a:t>Developer Release</a:t>
             </a:r>
           </a:p>
@@ -5734,7 +6181,7 @@
       </p:sp>
       <p:sp>
         <p:nvSpPr>
-          <p:cNvPr id="105" name="Shape 105"/>
+          <p:cNvPr id="108" name="Shape 108"/>
           <p:cNvSpPr/>
           <p:nvPr/>
         </p:nvSpPr>
@@ -5790,7 +6237,7 @@
       </p:sp>
       <p:sp>
         <p:nvSpPr>
-          <p:cNvPr id="106" name="Shape 106"/>
+          <p:cNvPr id="109" name="Shape 109"/>
           <p:cNvSpPr/>
           <p:nvPr/>
         </p:nvSpPr>
@@ -5858,7 +6305,7 @@
 </p:sld>
 </file>
 
-<file path=ppt/slides/slide24.xml><?xml version="1.0" encoding="utf-8"?>
+<file path=ppt/slides/slide25.xml><?xml version="1.0" encoding="utf-8"?>
 <p:sld xmlns:a="http://schemas.openxmlformats.org/drawingml/2006/main" xmlns:r="http://schemas.openxmlformats.org/officeDocument/2006/relationships" xmlns:p="http://schemas.openxmlformats.org/presentationml/2006/main" showMasterSp="1" showMasterPhAnim="1">
   <p:cSld>
     <p:spTree>
@@ -5877,7 +6324,7 @@
       </p:grpSpPr>
       <p:sp>
         <p:nvSpPr>
-          <p:cNvPr id="108" name="Shape 108"/>
+          <p:cNvPr id="111" name="Shape 111"/>
           <p:cNvSpPr/>
           <p:nvPr>
             <p:ph type="title"/>
@@ -5912,7 +6359,7 @@
       </p:sp>
       <p:pic>
         <p:nvPicPr>
-          <p:cNvPr id="109" name="Screen Shot 2015-03-11 at 12.23.40 PM.png"/>
+          <p:cNvPr id="112" name="Screen Shot 2015-03-11 at 12.23.40 PM.png"/>
           <p:cNvPicPr/>
           <p:nvPr/>
         </p:nvPicPr>
@@ -5939,7 +6386,7 @@
       </p:pic>
       <p:pic>
         <p:nvPicPr>
-          <p:cNvPr id="110" name="Screen Shot 2015-03-11 at 12.25.55 PM.png"/>
+          <p:cNvPr id="113" name="Screen Shot 2015-03-11 at 12.25.55 PM.png"/>
           <p:cNvPicPr/>
           <p:nvPr/>
         </p:nvPicPr>
@@ -5966,7 +6413,7 @@
       </p:pic>
       <p:sp>
         <p:nvSpPr>
-          <p:cNvPr id="111" name="Shape 111"/>
+          <p:cNvPr id="114" name="Shape 114"/>
           <p:cNvSpPr/>
           <p:nvPr/>
         </p:nvSpPr>
@@ -6089,267 +6536,6 @@
                 <a:sym typeface="Helvetica Light"/>
               </a:rPr>
               <a:t>AMPLab, Alteryx, Intel, DataBricks</a:t>
-            </a:r>
-          </a:p>
-        </p:txBody>
-      </p:sp>
-    </p:spTree>
-  </p:cSld>
-  <p:clrMapOvr>
-    <a:masterClrMapping/>
-  </p:clrMapOvr>
-  <p:transition spd="med" advClick="1"/>
-</p:sld>
-</file>
-
-<file path=ppt/slides/slide25.xml><?xml version="1.0" encoding="utf-8"?>
-<p:sld xmlns:a="http://schemas.openxmlformats.org/drawingml/2006/main" xmlns:r="http://schemas.openxmlformats.org/officeDocument/2006/relationships" xmlns:p="http://schemas.openxmlformats.org/presentationml/2006/main" showMasterSp="1" showMasterPhAnim="1">
-  <p:cSld>
-    <p:spTree>
-      <p:nvGrpSpPr>
-        <p:cNvPr id="1" name=""/>
-        <p:cNvGrpSpPr/>
-        <p:nvPr/>
-      </p:nvGrpSpPr>
-      <p:grpSpPr>
-        <a:xfrm>
-          <a:off x="0" y="0"/>
-          <a:ext cx="0" cy="0"/>
-          <a:chOff x="0" y="0"/>
-          <a:chExt cx="0" cy="0"/>
-        </a:xfrm>
-      </p:grpSpPr>
-      <p:sp>
-        <p:nvSpPr>
-          <p:cNvPr id="113" name="Shape 113"/>
-          <p:cNvSpPr/>
-          <p:nvPr>
-            <p:ph type="title"/>
-          </p:nvPr>
-        </p:nvSpPr>
-        <p:spPr>
-          <a:prstGeom prst="rect">
-            <a:avLst/>
-          </a:prstGeom>
-        </p:spPr>
-        <p:txBody>
-          <a:bodyPr/>
-          <a:lstStyle/>
-          <a:p>
-            <a:pPr lvl="0">
-              <a:defRPr sz="1800">
-                <a:solidFill>
-                  <a:srgbClr val="000000"/>
-                </a:solidFill>
-              </a:defRPr>
-            </a:pPr>
-            <a:r>
-              <a:rPr sz="8000">
-                <a:solidFill>
-                  <a:srgbClr val="FFFFFF"/>
-                </a:solidFill>
-              </a:rPr>
-              <a:t>On the Roadmap</a:t>
-            </a:r>
-          </a:p>
-        </p:txBody>
-      </p:sp>
-      <p:sp>
-        <p:nvSpPr>
-          <p:cNvPr id="114" name="Shape 114"/>
-          <p:cNvSpPr/>
-          <p:nvPr>
-            <p:ph type="body" idx="1"/>
-          </p:nvPr>
-        </p:nvSpPr>
-        <p:spPr>
-          <a:prstGeom prst="rect">
-            <a:avLst/>
-          </a:prstGeom>
-        </p:spPr>
-        <p:txBody>
-          <a:bodyPr/>
-          <a:lstStyle/>
-          <a:p>
-            <a:pPr lvl="0" marL="368934" indent="-368934" defTabSz="484886">
-              <a:spcBef>
-                <a:spcPts val="3400"/>
-              </a:spcBef>
-              <a:defRPr sz="1800">
-                <a:solidFill>
-                  <a:srgbClr val="000000"/>
-                </a:solidFill>
-              </a:defRPr>
-            </a:pPr>
-            <a:r>
-              <a:rPr sz="3237">
-                <a:solidFill>
-                  <a:srgbClr val="FFFFFF"/>
-                </a:solidFill>
-              </a:rPr>
-              <a:t>Feature-complete DataFrame API with additional R-like syntax and functions</a:t>
-            </a:r>
-            <a:endParaRPr sz="3237">
-              <a:solidFill>
-                <a:srgbClr val="FFFFFF"/>
-              </a:solidFill>
-            </a:endParaRPr>
-          </a:p>
-          <a:p>
-            <a:pPr lvl="0" marL="368934" indent="-368934" defTabSz="484886">
-              <a:spcBef>
-                <a:spcPts val="3400"/>
-              </a:spcBef>
-              <a:defRPr sz="1800">
-                <a:solidFill>
-                  <a:srgbClr val="000000"/>
-                </a:solidFill>
-              </a:defRPr>
-            </a:pPr>
-            <a:r>
-              <a:rPr sz="3237">
-                <a:solidFill>
-                  <a:srgbClr val="FFFFFF"/>
-                </a:solidFill>
-              </a:rPr>
-              <a:t>MLLib</a:t>
-            </a:r>
-            <a:endParaRPr sz="3237">
-              <a:solidFill>
-                <a:srgbClr val="FFFFFF"/>
-              </a:solidFill>
-            </a:endParaRPr>
-          </a:p>
-          <a:p>
-            <a:pPr lvl="1" marL="737869" indent="-368934" defTabSz="484886">
-              <a:spcBef>
-                <a:spcPts val="3400"/>
-              </a:spcBef>
-              <a:defRPr sz="1800">
-                <a:solidFill>
-                  <a:srgbClr val="000000"/>
-                </a:solidFill>
-              </a:defRPr>
-            </a:pPr>
-            <a:r>
-              <a:rPr sz="2490">
-                <a:solidFill>
-                  <a:srgbClr val="FFFFFF"/>
-                </a:solidFill>
-              </a:rPr>
-              <a:t>Integrate existing API</a:t>
-            </a:r>
-            <a:endParaRPr sz="2490">
-              <a:solidFill>
-                <a:srgbClr val="FFFFFF"/>
-              </a:solidFill>
-            </a:endParaRPr>
-          </a:p>
-          <a:p>
-            <a:pPr lvl="1" marL="737869" indent="-368934" defTabSz="484886">
-              <a:spcBef>
-                <a:spcPts val="3400"/>
-              </a:spcBef>
-              <a:defRPr sz="1800">
-                <a:solidFill>
-                  <a:srgbClr val="000000"/>
-                </a:solidFill>
-              </a:defRPr>
-            </a:pPr>
-            <a:r>
-              <a:rPr sz="2490">
-                <a:solidFill>
-                  <a:srgbClr val="FFFFFF"/>
-                </a:solidFill>
-              </a:rPr>
-              <a:t>Persistent Model Objects</a:t>
-            </a:r>
-            <a:endParaRPr sz="2490">
-              <a:solidFill>
-                <a:srgbClr val="FFFFFF"/>
-              </a:solidFill>
-            </a:endParaRPr>
-          </a:p>
-          <a:p>
-            <a:pPr lvl="1" marL="737869" indent="-368934" defTabSz="484886">
-              <a:spcBef>
-                <a:spcPts val="3400"/>
-              </a:spcBef>
-              <a:defRPr sz="1800">
-                <a:solidFill>
-                  <a:srgbClr val="000000"/>
-                </a:solidFill>
-              </a:defRPr>
-            </a:pPr>
-            <a:r>
-              <a:rPr sz="2490">
-                <a:solidFill>
-                  <a:srgbClr val="FFFFFF"/>
-                </a:solidFill>
-              </a:rPr>
-              <a:t>Extended reporting and summary methods for model objects</a:t>
-            </a:r>
-            <a:endParaRPr sz="2490">
-              <a:solidFill>
-                <a:srgbClr val="FFFFFF"/>
-              </a:solidFill>
-            </a:endParaRPr>
-          </a:p>
-          <a:p>
-            <a:pPr lvl="2" marL="1106805" indent="-368934" defTabSz="484886">
-              <a:spcBef>
-                <a:spcPts val="3400"/>
-              </a:spcBef>
-              <a:defRPr sz="1800">
-                <a:solidFill>
-                  <a:srgbClr val="000000"/>
-                </a:solidFill>
-              </a:defRPr>
-            </a:pPr>
-            <a:r>
-              <a:rPr sz="2490">
-                <a:solidFill>
-                  <a:srgbClr val="FFFFFF"/>
-                </a:solidFill>
-              </a:rPr>
-              <a:t>Similar to </a:t>
-            </a:r>
-            <a:r>
-              <a:rPr sz="2490">
-                <a:solidFill>
-                  <a:srgbClr val="FFFFFF"/>
-                </a:solidFill>
-                <a:latin typeface="Andale Mono"/>
-                <a:ea typeface="Andale Mono"/>
-                <a:cs typeface="Andale Mono"/>
-                <a:sym typeface="Andale Mono"/>
-              </a:rPr>
-              <a:t>glm.summary()</a:t>
-            </a:r>
-            <a:endParaRPr sz="2490">
-              <a:solidFill>
-                <a:srgbClr val="FFFFFF"/>
-              </a:solidFill>
-            </a:endParaRPr>
-          </a:p>
-          <a:p>
-            <a:pPr lvl="0" marL="368934" indent="-368934" defTabSz="484886">
-              <a:spcBef>
-                <a:spcPts val="3400"/>
-              </a:spcBef>
-              <a:defRPr sz="1800">
-                <a:solidFill>
-                  <a:srgbClr val="000000"/>
-                </a:solidFill>
-              </a:defRPr>
-            </a:pPr>
-            <a:r>
-              <a:rPr sz="3237">
-                <a:solidFill>
-                  <a:srgbClr val="FFFFFF"/>
-                </a:solidFill>
-              </a:rPr>
-              <a:t>Official API in Spark 1.4</a:t>
             </a:r>
           </a:p>
         </p:txBody>
@@ -6389,19 +6575,13 @@
           </p:nvPr>
         </p:nvSpPr>
         <p:spPr>
-          <a:xfrm>
-            <a:off x="1282700" y="254000"/>
-            <a:ext cx="11099800" cy="2159000"/>
-          </a:xfrm>
           <a:prstGeom prst="rect">
             <a:avLst/>
           </a:prstGeom>
         </p:spPr>
         <p:txBody>
           <a:bodyPr/>
-          <a:lstStyle>
-            <a:lvl1pPr algn="l"/>
-          </a:lstStyle>
+          <a:lstStyle/>
           <a:p>
             <a:pPr lvl="0">
               <a:defRPr sz="1800">
@@ -6416,7 +6596,7 @@
                   <a:srgbClr val="FFFFFF"/>
                 </a:solidFill>
               </a:rPr>
-              <a:t>Integration with </a:t>
+              <a:t>On the Roadmap</a:t>
             </a:r>
           </a:p>
         </p:txBody>
@@ -6435,6 +6615,273 @@
           </a:prstGeom>
         </p:spPr>
         <p:txBody>
+          <a:bodyPr/>
+          <a:lstStyle/>
+          <a:p>
+            <a:pPr lvl="0" marL="368934" indent="-368934" defTabSz="484886">
+              <a:spcBef>
+                <a:spcPts val="3400"/>
+              </a:spcBef>
+              <a:defRPr sz="1800">
+                <a:solidFill>
+                  <a:srgbClr val="000000"/>
+                </a:solidFill>
+              </a:defRPr>
+            </a:pPr>
+            <a:r>
+              <a:rPr sz="3237">
+                <a:solidFill>
+                  <a:srgbClr val="FFFFFF"/>
+                </a:solidFill>
+              </a:rPr>
+              <a:t>Feature-complete DataFrame API with additional R-like syntax and functions</a:t>
+            </a:r>
+            <a:endParaRPr sz="3237">
+              <a:solidFill>
+                <a:srgbClr val="FFFFFF"/>
+              </a:solidFill>
+            </a:endParaRPr>
+          </a:p>
+          <a:p>
+            <a:pPr lvl="0" marL="368934" indent="-368934" defTabSz="484886">
+              <a:spcBef>
+                <a:spcPts val="3400"/>
+              </a:spcBef>
+              <a:defRPr sz="1800">
+                <a:solidFill>
+                  <a:srgbClr val="000000"/>
+                </a:solidFill>
+              </a:defRPr>
+            </a:pPr>
+            <a:r>
+              <a:rPr sz="3237">
+                <a:solidFill>
+                  <a:srgbClr val="FFFFFF"/>
+                </a:solidFill>
+              </a:rPr>
+              <a:t>MLLib</a:t>
+            </a:r>
+            <a:endParaRPr sz="3237">
+              <a:solidFill>
+                <a:srgbClr val="FFFFFF"/>
+              </a:solidFill>
+            </a:endParaRPr>
+          </a:p>
+          <a:p>
+            <a:pPr lvl="1" marL="737869" indent="-368934" defTabSz="484886">
+              <a:spcBef>
+                <a:spcPts val="3400"/>
+              </a:spcBef>
+              <a:defRPr sz="1800">
+                <a:solidFill>
+                  <a:srgbClr val="000000"/>
+                </a:solidFill>
+              </a:defRPr>
+            </a:pPr>
+            <a:r>
+              <a:rPr sz="2490">
+                <a:solidFill>
+                  <a:srgbClr val="FFFFFF"/>
+                </a:solidFill>
+              </a:rPr>
+              <a:t>Integrate existing API</a:t>
+            </a:r>
+            <a:endParaRPr sz="2490">
+              <a:solidFill>
+                <a:srgbClr val="FFFFFF"/>
+              </a:solidFill>
+            </a:endParaRPr>
+          </a:p>
+          <a:p>
+            <a:pPr lvl="1" marL="737869" indent="-368934" defTabSz="484886">
+              <a:spcBef>
+                <a:spcPts val="3400"/>
+              </a:spcBef>
+              <a:defRPr sz="1800">
+                <a:solidFill>
+                  <a:srgbClr val="000000"/>
+                </a:solidFill>
+              </a:defRPr>
+            </a:pPr>
+            <a:r>
+              <a:rPr sz="2490">
+                <a:solidFill>
+                  <a:srgbClr val="FFFFFF"/>
+                </a:solidFill>
+              </a:rPr>
+              <a:t>Persistent Model Objects</a:t>
+            </a:r>
+            <a:endParaRPr sz="2490">
+              <a:solidFill>
+                <a:srgbClr val="FFFFFF"/>
+              </a:solidFill>
+            </a:endParaRPr>
+          </a:p>
+          <a:p>
+            <a:pPr lvl="1" marL="737869" indent="-368934" defTabSz="484886">
+              <a:spcBef>
+                <a:spcPts val="3400"/>
+              </a:spcBef>
+              <a:defRPr sz="1800">
+                <a:solidFill>
+                  <a:srgbClr val="000000"/>
+                </a:solidFill>
+              </a:defRPr>
+            </a:pPr>
+            <a:r>
+              <a:rPr sz="2490">
+                <a:solidFill>
+                  <a:srgbClr val="FFFFFF"/>
+                </a:solidFill>
+              </a:rPr>
+              <a:t>Extended reporting and summary methods for model objects</a:t>
+            </a:r>
+            <a:endParaRPr sz="2490">
+              <a:solidFill>
+                <a:srgbClr val="FFFFFF"/>
+              </a:solidFill>
+            </a:endParaRPr>
+          </a:p>
+          <a:p>
+            <a:pPr lvl="2" marL="1106805" indent="-368934" defTabSz="484886">
+              <a:spcBef>
+                <a:spcPts val="3400"/>
+              </a:spcBef>
+              <a:defRPr sz="1800">
+                <a:solidFill>
+                  <a:srgbClr val="000000"/>
+                </a:solidFill>
+              </a:defRPr>
+            </a:pPr>
+            <a:r>
+              <a:rPr sz="2490">
+                <a:solidFill>
+                  <a:srgbClr val="FFFFFF"/>
+                </a:solidFill>
+              </a:rPr>
+              <a:t>Similar to </a:t>
+            </a:r>
+            <a:r>
+              <a:rPr sz="2490">
+                <a:solidFill>
+                  <a:srgbClr val="FFFFFF"/>
+                </a:solidFill>
+                <a:latin typeface="Andale Mono"/>
+                <a:ea typeface="Andale Mono"/>
+                <a:cs typeface="Andale Mono"/>
+                <a:sym typeface="Andale Mono"/>
+              </a:rPr>
+              <a:t>glm.summary()</a:t>
+            </a:r>
+            <a:endParaRPr sz="2490">
+              <a:solidFill>
+                <a:srgbClr val="FFFFFF"/>
+              </a:solidFill>
+            </a:endParaRPr>
+          </a:p>
+          <a:p>
+            <a:pPr lvl="0" marL="368934" indent="-368934" defTabSz="484886">
+              <a:spcBef>
+                <a:spcPts val="3400"/>
+              </a:spcBef>
+              <a:defRPr sz="1800">
+                <a:solidFill>
+                  <a:srgbClr val="000000"/>
+                </a:solidFill>
+              </a:defRPr>
+            </a:pPr>
+            <a:r>
+              <a:rPr sz="3237">
+                <a:solidFill>
+                  <a:srgbClr val="FFFFFF"/>
+                </a:solidFill>
+              </a:rPr>
+              <a:t>Official API in Spark 1.4</a:t>
+            </a:r>
+          </a:p>
+        </p:txBody>
+      </p:sp>
+    </p:spTree>
+  </p:cSld>
+  <p:clrMapOvr>
+    <a:masterClrMapping/>
+  </p:clrMapOvr>
+  <p:transition spd="med" advClick="1"/>
+</p:sld>
+</file>
+
+<file path=ppt/slides/slide27.xml><?xml version="1.0" encoding="utf-8"?>
+<p:sld xmlns:a="http://schemas.openxmlformats.org/drawingml/2006/main" xmlns:r="http://schemas.openxmlformats.org/officeDocument/2006/relationships" xmlns:p="http://schemas.openxmlformats.org/presentationml/2006/main" showMasterSp="1" showMasterPhAnim="1">
+  <p:cSld>
+    <p:spTree>
+      <p:nvGrpSpPr>
+        <p:cNvPr id="1" name=""/>
+        <p:cNvGrpSpPr/>
+        <p:nvPr/>
+      </p:nvGrpSpPr>
+      <p:grpSpPr>
+        <a:xfrm>
+          <a:off x="0" y="0"/>
+          <a:ext cx="0" cy="0"/>
+          <a:chOff x="0" y="0"/>
+          <a:chExt cx="0" cy="0"/>
+        </a:xfrm>
+      </p:grpSpPr>
+      <p:sp>
+        <p:nvSpPr>
+          <p:cNvPr id="119" name="Shape 119"/>
+          <p:cNvSpPr/>
+          <p:nvPr>
+            <p:ph type="title"/>
+          </p:nvPr>
+        </p:nvSpPr>
+        <p:spPr>
+          <a:xfrm>
+            <a:off x="1282700" y="254000"/>
+            <a:ext cx="11099800" cy="2159000"/>
+          </a:xfrm>
+          <a:prstGeom prst="rect">
+            <a:avLst/>
+          </a:prstGeom>
+        </p:spPr>
+        <p:txBody>
+          <a:bodyPr/>
+          <a:lstStyle>
+            <a:lvl1pPr algn="l"/>
+          </a:lstStyle>
+          <a:p>
+            <a:pPr lvl="0">
+              <a:defRPr sz="1800">
+                <a:solidFill>
+                  <a:srgbClr val="000000"/>
+                </a:solidFill>
+              </a:defRPr>
+            </a:pPr>
+            <a:r>
+              <a:rPr sz="8000">
+                <a:solidFill>
+                  <a:srgbClr val="FFFFFF"/>
+                </a:solidFill>
+              </a:rPr>
+              <a:t>Integration with </a:t>
+            </a:r>
+          </a:p>
+        </p:txBody>
+      </p:sp>
+      <p:sp>
+        <p:nvSpPr>
+          <p:cNvPr id="120" name="Shape 120"/>
+          <p:cNvSpPr/>
+          <p:nvPr>
+            <p:ph type="body" idx="1"/>
+          </p:nvPr>
+        </p:nvSpPr>
+        <p:spPr>
+          <a:prstGeom prst="rect">
+            <a:avLst/>
+          </a:prstGeom>
+        </p:spPr>
+        <p:txBody>
           <a:bodyPr anchor="t"/>
           <a:lstStyle/>
           <a:p>
@@ -6502,7 +6949,7 @@
       </p:sp>
       <p:pic>
         <p:nvPicPr>
-          <p:cNvPr id="118" name="alteryx.gif"/>
+          <p:cNvPr id="121" name="alteryx.gif"/>
           <p:cNvPicPr/>
           <p:nvPr/>
         </p:nvPicPr>
@@ -6536,7 +6983,7 @@
 </p:sld>
 </file>
 
-<file path=ppt/slides/slide27.xml><?xml version="1.0" encoding="utf-8"?>
+<file path=ppt/slides/slide28.xml><?xml version="1.0" encoding="utf-8"?>
 <p:sld xmlns:a="http://schemas.openxmlformats.org/drawingml/2006/main" xmlns:r="http://schemas.openxmlformats.org/officeDocument/2006/relationships" xmlns:p="http://schemas.openxmlformats.org/presentationml/2006/main" showMasterSp="1" showMasterPhAnim="1">
   <p:cSld>
     <p:spTree>
@@ -6555,7 +7002,7 @@
       </p:grpSpPr>
       <p:sp>
         <p:nvSpPr>
-          <p:cNvPr id="120" name="Shape 120"/>
+          <p:cNvPr id="123" name="Shape 123"/>
           <p:cNvSpPr/>
           <p:nvPr>
             <p:ph type="title"/>
@@ -7219,7 +7666,7 @@
                   <a:srgbClr val="FFFFFF"/>
                 </a:solidFill>
               </a:rPr>
-              <a:t>An R-based API for Spark</a:t>
+              <a:t>An R package that provides a familiar API for Spark</a:t>
             </a:r>
             <a:endParaRPr sz="3800">
               <a:solidFill>
@@ -7263,7 +7710,7 @@
                   <a:srgbClr val="FFFFFF"/>
                 </a:solidFill>
               </a:rPr>
-              <a:t>Enables use of R packages and functions via the RRDD construct</a:t>
+              <a:t>Extend RDDs with R packages and functions via the RRDD construct</a:t>
             </a:r>
           </a:p>
         </p:txBody>
@@ -7404,6 +7851,28 @@
                 </a:solidFill>
               </a:rPr>
               <a:t>Acts as a distributed list when calling R functions</a:t>
+            </a:r>
+            <a:endParaRPr sz="3800">
+              <a:solidFill>
+                <a:srgbClr val="FFFFFF"/>
+              </a:solidFill>
+            </a:endParaRPr>
+          </a:p>
+          <a:p>
+            <a:pPr lvl="1">
+              <a:defRPr sz="1800">
+                <a:solidFill>
+                  <a:srgbClr val="000000"/>
+                </a:solidFill>
+              </a:defRPr>
+            </a:pPr>
+            <a:r>
+              <a:rPr sz="3000">
+                <a:solidFill>
+                  <a:srgbClr val="FFFFFF"/>
+                </a:solidFill>
+              </a:rPr>
+              <a:t>Separate R workers for each node in the cluster</a:t>
             </a:r>
           </a:p>
         </p:txBody>

</xml_diff>